<commit_message>
forget password not finished
</commit_message>
<xml_diff>
--- a/docs/node js.pptx
+++ b/docs/node js.pptx
@@ -47,6 +47,7 @@
     <p:sldId id="295" r:id="rId41"/>
     <p:sldId id="296" r:id="rId42"/>
     <p:sldId id="297" r:id="rId43"/>
+    <p:sldId id="298" r:id="rId44"/>
   </p:sldIdLst>
   <p:sldSz cx="12192000" cy="6858000"/>
   <p:notesSz cx="6858000" cy="9144000"/>
@@ -214,7 +215,7 @@
           <a:noFill/>
           <a:extLst>
             <a:ext uri="{909E8E84-426E-40dd-AFC4-6F175D3DCCD1}">
-              <a14:hiddenFill xmlns="" xmlns:a14="http://schemas.microsoft.com/office/drawing/2010/main">
+              <a14:hiddenFill xmlns:a14="http://schemas.microsoft.com/office/drawing/2010/main" xmlns="">
                 <a:solidFill>
                   <a:srgbClr val="FFFFFF"/>
                 </a:solidFill>
@@ -274,7 +275,7 @@
             </a:ln>
             <a:extLst>
               <a:ext uri="{91240B29-F687-4f45-9708-019B960494DF}">
-                <a14:hiddenLine xmlns="" xmlns:a14="http://schemas.microsoft.com/office/drawing/2010/main" w="9525">
+                <a14:hiddenLine xmlns:a14="http://schemas.microsoft.com/office/drawing/2010/main" xmlns="" w="9525">
                   <a:solidFill>
                     <a:srgbClr val="000000"/>
                   </a:solidFill>
@@ -364,7 +365,7 @@
             </a:ln>
             <a:extLst>
               <a:ext uri="{91240B29-F687-4f45-9708-019B960494DF}">
-                <a14:hiddenLine xmlns="" xmlns:a14="http://schemas.microsoft.com/office/drawing/2010/main" w="9525">
+                <a14:hiddenLine xmlns:a14="http://schemas.microsoft.com/office/drawing/2010/main" xmlns="" w="9525">
                   <a:solidFill>
                     <a:srgbClr val="000000"/>
                   </a:solidFill>
@@ -454,7 +455,7 @@
             </a:ln>
             <a:extLst>
               <a:ext uri="{91240B29-F687-4f45-9708-019B960494DF}">
-                <a14:hiddenLine xmlns="" xmlns:a14="http://schemas.microsoft.com/office/drawing/2010/main" w="9525">
+                <a14:hiddenLine xmlns:a14="http://schemas.microsoft.com/office/drawing/2010/main" xmlns="" w="9525">
                   <a:solidFill>
                     <a:srgbClr val="000000"/>
                   </a:solidFill>
@@ -488,7 +489,7 @@
             </a:ln>
             <a:extLst>
               <a:ext uri="{91240B29-F687-4f45-9708-019B960494DF}">
-                <a14:hiddenLine xmlns="" xmlns:a14="http://schemas.microsoft.com/office/drawing/2010/main" w="9525">
+                <a14:hiddenLine xmlns:a14="http://schemas.microsoft.com/office/drawing/2010/main" xmlns="" w="9525">
                   <a:solidFill>
                     <a:srgbClr val="000000"/>
                   </a:solidFill>
@@ -578,7 +579,7 @@
             </a:ln>
             <a:extLst>
               <a:ext uri="{91240B29-F687-4f45-9708-019B960494DF}">
-                <a14:hiddenLine xmlns="" xmlns:a14="http://schemas.microsoft.com/office/drawing/2010/main" w="9525">
+                <a14:hiddenLine xmlns:a14="http://schemas.microsoft.com/office/drawing/2010/main" xmlns="" w="9525">
                   <a:solidFill>
                     <a:srgbClr val="000000"/>
                   </a:solidFill>
@@ -640,7 +641,7 @@
             </a:ln>
             <a:extLst>
               <a:ext uri="{91240B29-F687-4f45-9708-019B960494DF}">
-                <a14:hiddenLine xmlns="" xmlns:a14="http://schemas.microsoft.com/office/drawing/2010/main" w="9525">
+                <a14:hiddenLine xmlns:a14="http://schemas.microsoft.com/office/drawing/2010/main" xmlns="" w="9525">
                   <a:solidFill>
                     <a:srgbClr val="000000"/>
                   </a:solidFill>
@@ -702,7 +703,7 @@
             </a:ln>
             <a:extLst>
               <a:ext uri="{91240B29-F687-4f45-9708-019B960494DF}">
-                <a14:hiddenLine xmlns="" xmlns:a14="http://schemas.microsoft.com/office/drawing/2010/main" w="9525">
+                <a14:hiddenLine xmlns:a14="http://schemas.microsoft.com/office/drawing/2010/main" xmlns="" w="9525">
                   <a:solidFill>
                     <a:srgbClr val="000000"/>
                   </a:solidFill>
@@ -792,7 +793,7 @@
             </a:ln>
             <a:extLst>
               <a:ext uri="{91240B29-F687-4f45-9708-019B960494DF}">
-                <a14:hiddenLine xmlns="" xmlns:a14="http://schemas.microsoft.com/office/drawing/2010/main" w="9525">
+                <a14:hiddenLine xmlns:a14="http://schemas.microsoft.com/office/drawing/2010/main" xmlns="" w="9525">
                   <a:solidFill>
                     <a:srgbClr val="000000"/>
                   </a:solidFill>
@@ -854,7 +855,7 @@
             </a:ln>
             <a:extLst>
               <a:ext uri="{91240B29-F687-4f45-9708-019B960494DF}">
-                <a14:hiddenLine xmlns="" xmlns:a14="http://schemas.microsoft.com/office/drawing/2010/main" w="9525">
+                <a14:hiddenLine xmlns:a14="http://schemas.microsoft.com/office/drawing/2010/main" xmlns="" w="9525">
                   <a:solidFill>
                     <a:srgbClr val="000000"/>
                   </a:solidFill>
@@ -916,7 +917,7 @@
             </a:ln>
             <a:extLst>
               <a:ext uri="{91240B29-F687-4f45-9708-019B960494DF}">
-                <a14:hiddenLine xmlns="" xmlns:a14="http://schemas.microsoft.com/office/drawing/2010/main" w="9525">
+                <a14:hiddenLine xmlns:a14="http://schemas.microsoft.com/office/drawing/2010/main" xmlns="" w="9525">
                   <a:solidFill>
                     <a:srgbClr val="000000"/>
                   </a:solidFill>
@@ -1006,7 +1007,7 @@
             </a:ln>
             <a:extLst>
               <a:ext uri="{91240B29-F687-4f45-9708-019B960494DF}">
-                <a14:hiddenLine xmlns="" xmlns:a14="http://schemas.microsoft.com/office/drawing/2010/main" w="9525">
+                <a14:hiddenLine xmlns:a14="http://schemas.microsoft.com/office/drawing/2010/main" xmlns="" w="9525">
                   <a:solidFill>
                     <a:srgbClr val="000000"/>
                   </a:solidFill>
@@ -1096,7 +1097,7 @@
             </a:ln>
             <a:extLst>
               <a:ext uri="{91240B29-F687-4f45-9708-019B960494DF}">
-                <a14:hiddenLine xmlns="" xmlns:a14="http://schemas.microsoft.com/office/drawing/2010/main" w="9525">
+                <a14:hiddenLine xmlns:a14="http://schemas.microsoft.com/office/drawing/2010/main" xmlns="" w="9525">
                   <a:solidFill>
                     <a:srgbClr val="000000"/>
                   </a:solidFill>
@@ -1158,7 +1159,7 @@
             </a:ln>
             <a:extLst>
               <a:ext uri="{91240B29-F687-4f45-9708-019B960494DF}">
-                <a14:hiddenLine xmlns="" xmlns:a14="http://schemas.microsoft.com/office/drawing/2010/main" w="9525">
+                <a14:hiddenLine xmlns:a14="http://schemas.microsoft.com/office/drawing/2010/main" xmlns="" w="9525">
                   <a:solidFill>
                     <a:srgbClr val="000000"/>
                   </a:solidFill>
@@ -1268,7 +1269,7 @@
             </a:ln>
             <a:extLst>
               <a:ext uri="{91240B29-F687-4f45-9708-019B960494DF}">
-                <a14:hiddenLine xmlns="" xmlns:a14="http://schemas.microsoft.com/office/drawing/2010/main" w="9525">
+                <a14:hiddenLine xmlns:a14="http://schemas.microsoft.com/office/drawing/2010/main" xmlns="" w="9525">
                   <a:solidFill>
                     <a:srgbClr val="000000"/>
                   </a:solidFill>
@@ -1330,7 +1331,7 @@
             </a:ln>
             <a:extLst>
               <a:ext uri="{91240B29-F687-4f45-9708-019B960494DF}">
-                <a14:hiddenLine xmlns="" xmlns:a14="http://schemas.microsoft.com/office/drawing/2010/main" w="9525">
+                <a14:hiddenLine xmlns:a14="http://schemas.microsoft.com/office/drawing/2010/main" xmlns="" w="9525">
                   <a:solidFill>
                     <a:srgbClr val="000000"/>
                   </a:solidFill>
@@ -1420,7 +1421,7 @@
             </a:ln>
             <a:extLst>
               <a:ext uri="{91240B29-F687-4f45-9708-019B960494DF}">
-                <a14:hiddenLine xmlns="" xmlns:a14="http://schemas.microsoft.com/office/drawing/2010/main" w="9525">
+                <a14:hiddenLine xmlns:a14="http://schemas.microsoft.com/office/drawing/2010/main" xmlns="" w="9525">
                   <a:solidFill>
                     <a:srgbClr val="000000"/>
                   </a:solidFill>
@@ -1510,7 +1511,7 @@
             </a:ln>
             <a:extLst>
               <a:ext uri="{91240B29-F687-4f45-9708-019B960494DF}">
-                <a14:hiddenLine xmlns="" xmlns:a14="http://schemas.microsoft.com/office/drawing/2010/main" w="9525">
+                <a14:hiddenLine xmlns:a14="http://schemas.microsoft.com/office/drawing/2010/main" xmlns="" w="9525">
                   <a:solidFill>
                     <a:srgbClr val="000000"/>
                   </a:solidFill>
@@ -1572,7 +1573,7 @@
             </a:ln>
             <a:extLst>
               <a:ext uri="{91240B29-F687-4f45-9708-019B960494DF}">
-                <a14:hiddenLine xmlns="" xmlns:a14="http://schemas.microsoft.com/office/drawing/2010/main" w="9525">
+                <a14:hiddenLine xmlns:a14="http://schemas.microsoft.com/office/drawing/2010/main" xmlns="" w="9525">
                   <a:solidFill>
                     <a:srgbClr val="000000"/>
                   </a:solidFill>
@@ -1662,7 +1663,7 @@
             </a:ln>
             <a:extLst>
               <a:ext uri="{91240B29-F687-4f45-9708-019B960494DF}">
-                <a14:hiddenLine xmlns="" xmlns:a14="http://schemas.microsoft.com/office/drawing/2010/main" w="9525">
+                <a14:hiddenLine xmlns:a14="http://schemas.microsoft.com/office/drawing/2010/main" xmlns="" w="9525">
                   <a:solidFill>
                     <a:srgbClr val="000000"/>
                   </a:solidFill>
@@ -1752,7 +1753,7 @@
             </a:ln>
             <a:extLst>
               <a:ext uri="{91240B29-F687-4f45-9708-019B960494DF}">
-                <a14:hiddenLine xmlns="" xmlns:a14="http://schemas.microsoft.com/office/drawing/2010/main" w="9525">
+                <a14:hiddenLine xmlns:a14="http://schemas.microsoft.com/office/drawing/2010/main" xmlns="" w="9525">
                   <a:solidFill>
                     <a:srgbClr val="000000"/>
                   </a:solidFill>
@@ -1808,7 +1809,7 @@
             </a:ln>
             <a:extLst>
               <a:ext uri="{91240B29-F687-4f45-9708-019B960494DF}">
-                <a14:hiddenLine xmlns="" xmlns:a14="http://schemas.microsoft.com/office/drawing/2010/main" w="9525">
+                <a14:hiddenLine xmlns:a14="http://schemas.microsoft.com/office/drawing/2010/main" xmlns="" w="9525">
                   <a:solidFill>
                     <a:srgbClr val="000000"/>
                   </a:solidFill>
@@ -1898,7 +1899,7 @@
             </a:ln>
             <a:extLst>
               <a:ext uri="{91240B29-F687-4f45-9708-019B960494DF}">
-                <a14:hiddenLine xmlns="" xmlns:a14="http://schemas.microsoft.com/office/drawing/2010/main" w="9525">
+                <a14:hiddenLine xmlns:a14="http://schemas.microsoft.com/office/drawing/2010/main" xmlns="" w="9525">
                   <a:solidFill>
                     <a:srgbClr val="000000"/>
                   </a:solidFill>
@@ -1954,7 +1955,7 @@
             </a:ln>
             <a:extLst>
               <a:ext uri="{91240B29-F687-4f45-9708-019B960494DF}">
-                <a14:hiddenLine xmlns="" xmlns:a14="http://schemas.microsoft.com/office/drawing/2010/main" w="9525">
+                <a14:hiddenLine xmlns:a14="http://schemas.microsoft.com/office/drawing/2010/main" xmlns="" w="9525">
                   <a:solidFill>
                     <a:srgbClr val="000000"/>
                   </a:solidFill>
@@ -2044,7 +2045,7 @@
             </a:ln>
             <a:extLst>
               <a:ext uri="{91240B29-F687-4f45-9708-019B960494DF}">
-                <a14:hiddenLine xmlns="" xmlns:a14="http://schemas.microsoft.com/office/drawing/2010/main" w="9525">
+                <a14:hiddenLine xmlns:a14="http://schemas.microsoft.com/office/drawing/2010/main" xmlns="" w="9525">
                   <a:solidFill>
                     <a:srgbClr val="000000"/>
                   </a:solidFill>
@@ -2112,7 +2113,7 @@
             </a:ln>
             <a:extLst>
               <a:ext uri="{91240B29-F687-4f45-9708-019B960494DF}">
-                <a14:hiddenLine xmlns="" xmlns:a14="http://schemas.microsoft.com/office/drawing/2010/main" w="9525">
+                <a14:hiddenLine xmlns:a14="http://schemas.microsoft.com/office/drawing/2010/main" xmlns="" w="9525">
                   <a:solidFill>
                     <a:srgbClr val="000000"/>
                   </a:solidFill>
@@ -2202,7 +2203,7 @@
             </a:ln>
             <a:extLst>
               <a:ext uri="{91240B29-F687-4f45-9708-019B960494DF}">
-                <a14:hiddenLine xmlns="" xmlns:a14="http://schemas.microsoft.com/office/drawing/2010/main" w="9525">
+                <a14:hiddenLine xmlns:a14="http://schemas.microsoft.com/office/drawing/2010/main" xmlns="" w="9525">
                   <a:solidFill>
                     <a:srgbClr val="000000"/>
                   </a:solidFill>
@@ -2270,7 +2271,7 @@
             </a:ln>
             <a:extLst>
               <a:ext uri="{91240B29-F687-4f45-9708-019B960494DF}">
-                <a14:hiddenLine xmlns="" xmlns:a14="http://schemas.microsoft.com/office/drawing/2010/main" w="9525">
+                <a14:hiddenLine xmlns:a14="http://schemas.microsoft.com/office/drawing/2010/main" xmlns="" w="9525">
                   <a:solidFill>
                     <a:srgbClr val="000000"/>
                   </a:solidFill>
@@ -2360,7 +2361,7 @@
             </a:ln>
             <a:extLst>
               <a:ext uri="{91240B29-F687-4f45-9708-019B960494DF}">
-                <a14:hiddenLine xmlns="" xmlns:a14="http://schemas.microsoft.com/office/drawing/2010/main" w="9525">
+                <a14:hiddenLine xmlns:a14="http://schemas.microsoft.com/office/drawing/2010/main" xmlns="" w="9525">
                   <a:solidFill>
                     <a:srgbClr val="000000"/>
                   </a:solidFill>
@@ -2394,7 +2395,7 @@
             </a:ln>
             <a:extLst>
               <a:ext uri="{91240B29-F687-4f45-9708-019B960494DF}">
-                <a14:hiddenLine xmlns="" xmlns:a14="http://schemas.microsoft.com/office/drawing/2010/main" w="9525">
+                <a14:hiddenLine xmlns:a14="http://schemas.microsoft.com/office/drawing/2010/main" xmlns="" w="9525">
                   <a:solidFill>
                     <a:srgbClr val="000000"/>
                   </a:solidFill>
@@ -2484,7 +2485,7 @@
             </a:ln>
             <a:extLst>
               <a:ext uri="{91240B29-F687-4f45-9708-019B960494DF}">
-                <a14:hiddenLine xmlns="" xmlns:a14="http://schemas.microsoft.com/office/drawing/2010/main" w="9525">
+                <a14:hiddenLine xmlns:a14="http://schemas.microsoft.com/office/drawing/2010/main" xmlns="" w="9525">
                   <a:solidFill>
                     <a:srgbClr val="000000"/>
                   </a:solidFill>
@@ -2546,7 +2547,7 @@
             </a:ln>
             <a:extLst>
               <a:ext uri="{91240B29-F687-4f45-9708-019B960494DF}">
-                <a14:hiddenLine xmlns="" xmlns:a14="http://schemas.microsoft.com/office/drawing/2010/main" w="9525">
+                <a14:hiddenLine xmlns:a14="http://schemas.microsoft.com/office/drawing/2010/main" xmlns="" w="9525">
                   <a:solidFill>
                     <a:srgbClr val="000000"/>
                   </a:solidFill>
@@ -2608,7 +2609,7 @@
             </a:ln>
             <a:extLst>
               <a:ext uri="{91240B29-F687-4f45-9708-019B960494DF}">
-                <a14:hiddenLine xmlns="" xmlns:a14="http://schemas.microsoft.com/office/drawing/2010/main" w="9525">
+                <a14:hiddenLine xmlns:a14="http://schemas.microsoft.com/office/drawing/2010/main" xmlns="" w="9525">
                   <a:solidFill>
                     <a:srgbClr val="000000"/>
                   </a:solidFill>
@@ -2698,7 +2699,7 @@
             </a:ln>
             <a:extLst>
               <a:ext uri="{91240B29-F687-4f45-9708-019B960494DF}">
-                <a14:hiddenLine xmlns="" xmlns:a14="http://schemas.microsoft.com/office/drawing/2010/main" w="9525">
+                <a14:hiddenLine xmlns:a14="http://schemas.microsoft.com/office/drawing/2010/main" xmlns="" w="9525">
                   <a:solidFill>
                     <a:srgbClr val="000000"/>
                   </a:solidFill>
@@ -2766,7 +2767,7 @@
             </a:ln>
             <a:extLst>
               <a:ext uri="{91240B29-F687-4f45-9708-019B960494DF}">
-                <a14:hiddenLine xmlns="" xmlns:a14="http://schemas.microsoft.com/office/drawing/2010/main" w="9525">
+                <a14:hiddenLine xmlns:a14="http://schemas.microsoft.com/office/drawing/2010/main" xmlns="" w="9525">
                   <a:solidFill>
                     <a:srgbClr val="000000"/>
                   </a:solidFill>
@@ -2828,7 +2829,7 @@
             </a:ln>
             <a:extLst>
               <a:ext uri="{91240B29-F687-4f45-9708-019B960494DF}">
-                <a14:hiddenLine xmlns="" xmlns:a14="http://schemas.microsoft.com/office/drawing/2010/main" w="9525">
+                <a14:hiddenLine xmlns:a14="http://schemas.microsoft.com/office/drawing/2010/main" xmlns="" w="9525">
                   <a:solidFill>
                     <a:srgbClr val="000000"/>
                   </a:solidFill>
@@ -2918,7 +2919,7 @@
             </a:ln>
             <a:extLst>
               <a:ext uri="{91240B29-F687-4f45-9708-019B960494DF}">
-                <a14:hiddenLine xmlns="" xmlns:a14="http://schemas.microsoft.com/office/drawing/2010/main" w="9525">
+                <a14:hiddenLine xmlns:a14="http://schemas.microsoft.com/office/drawing/2010/main" xmlns="" w="9525">
                   <a:solidFill>
                     <a:srgbClr val="000000"/>
                   </a:solidFill>
@@ -2980,7 +2981,7 @@
             </a:ln>
             <a:extLst>
               <a:ext uri="{91240B29-F687-4f45-9708-019B960494DF}">
-                <a14:hiddenLine xmlns="" xmlns:a14="http://schemas.microsoft.com/office/drawing/2010/main" w="9525">
+                <a14:hiddenLine xmlns:a14="http://schemas.microsoft.com/office/drawing/2010/main" xmlns="" w="9525">
                   <a:solidFill>
                     <a:srgbClr val="000000"/>
                   </a:solidFill>
@@ -3070,7 +3071,7 @@
             </a:ln>
             <a:extLst>
               <a:ext uri="{91240B29-F687-4f45-9708-019B960494DF}">
-                <a14:hiddenLine xmlns="" xmlns:a14="http://schemas.microsoft.com/office/drawing/2010/main" w="9525">
+                <a14:hiddenLine xmlns:a14="http://schemas.microsoft.com/office/drawing/2010/main" xmlns="" w="9525">
                   <a:solidFill>
                     <a:srgbClr val="000000"/>
                   </a:solidFill>
@@ -3132,7 +3133,7 @@
             </a:ln>
             <a:extLst>
               <a:ext uri="{91240B29-F687-4f45-9708-019B960494DF}">
-                <a14:hiddenLine xmlns="" xmlns:a14="http://schemas.microsoft.com/office/drawing/2010/main" w="9525">
+                <a14:hiddenLine xmlns:a14="http://schemas.microsoft.com/office/drawing/2010/main" xmlns="" w="9525">
                   <a:solidFill>
                     <a:srgbClr val="000000"/>
                   </a:solidFill>
@@ -3222,7 +3223,7 @@
             </a:ln>
             <a:extLst>
               <a:ext uri="{91240B29-F687-4f45-9708-019B960494DF}">
-                <a14:hiddenLine xmlns="" xmlns:a14="http://schemas.microsoft.com/office/drawing/2010/main" w="9525">
+                <a14:hiddenLine xmlns:a14="http://schemas.microsoft.com/office/drawing/2010/main" xmlns="" w="9525">
                   <a:solidFill>
                     <a:srgbClr val="000000"/>
                   </a:solidFill>
@@ -3256,7 +3257,7 @@
             </a:ln>
             <a:extLst>
               <a:ext uri="{91240B29-F687-4f45-9708-019B960494DF}">
-                <a14:hiddenLine xmlns="" xmlns:a14="http://schemas.microsoft.com/office/drawing/2010/main" w="9525">
+                <a14:hiddenLine xmlns:a14="http://schemas.microsoft.com/office/drawing/2010/main" xmlns="" w="9525">
                   <a:solidFill>
                     <a:srgbClr val="000000"/>
                   </a:solidFill>
@@ -3321,7 +3322,7 @@
             </a:ln>
             <a:extLst>
               <a:ext uri="{91240B29-F687-4f45-9708-019B960494DF}">
-                <a14:hiddenLine xmlns="" xmlns:a14="http://schemas.microsoft.com/office/drawing/2010/main" w="9525">
+                <a14:hiddenLine xmlns:a14="http://schemas.microsoft.com/office/drawing/2010/main" xmlns="" w="9525">
                   <a:solidFill>
                     <a:srgbClr val="000000"/>
                   </a:solidFill>
@@ -3411,7 +3412,7 @@
             </a:ln>
             <a:extLst>
               <a:ext uri="{91240B29-F687-4f45-9708-019B960494DF}">
-                <a14:hiddenLine xmlns="" xmlns:a14="http://schemas.microsoft.com/office/drawing/2010/main" w="9525">
+                <a14:hiddenLine xmlns:a14="http://schemas.microsoft.com/office/drawing/2010/main" xmlns="" w="9525">
                   <a:solidFill>
                     <a:srgbClr val="000000"/>
                   </a:solidFill>
@@ -3473,7 +3474,7 @@
             </a:ln>
             <a:extLst>
               <a:ext uri="{91240B29-F687-4f45-9708-019B960494DF}">
-                <a14:hiddenLine xmlns="" xmlns:a14="http://schemas.microsoft.com/office/drawing/2010/main" w="9525">
+                <a14:hiddenLine xmlns:a14="http://schemas.microsoft.com/office/drawing/2010/main" xmlns="" w="9525">
                   <a:solidFill>
                     <a:srgbClr val="000000"/>
                   </a:solidFill>
@@ -3563,7 +3564,7 @@
             </a:ln>
             <a:extLst>
               <a:ext uri="{91240B29-F687-4f45-9708-019B960494DF}">
-                <a14:hiddenLine xmlns="" xmlns:a14="http://schemas.microsoft.com/office/drawing/2010/main" w="9525">
+                <a14:hiddenLine xmlns:a14="http://schemas.microsoft.com/office/drawing/2010/main" xmlns="" w="9525">
                   <a:solidFill>
                     <a:srgbClr val="000000"/>
                   </a:solidFill>
@@ -3653,7 +3654,7 @@
             </a:ln>
             <a:extLst>
               <a:ext uri="{91240B29-F687-4f45-9708-019B960494DF}">
-                <a14:hiddenLine xmlns="" xmlns:a14="http://schemas.microsoft.com/office/drawing/2010/main" w="9525">
+                <a14:hiddenLine xmlns:a14="http://schemas.microsoft.com/office/drawing/2010/main" xmlns="" w="9525">
                   <a:solidFill>
                     <a:srgbClr val="000000"/>
                   </a:solidFill>
@@ -3718,7 +3719,7 @@
             </a:ln>
             <a:extLst>
               <a:ext uri="{91240B29-F687-4f45-9708-019B960494DF}">
-                <a14:hiddenLine xmlns="" xmlns:a14="http://schemas.microsoft.com/office/drawing/2010/main" w="9525">
+                <a14:hiddenLine xmlns:a14="http://schemas.microsoft.com/office/drawing/2010/main" xmlns="" w="9525">
                   <a:solidFill>
                     <a:srgbClr val="000000"/>
                   </a:solidFill>
@@ -3780,7 +3781,7 @@
             </a:ln>
             <a:extLst>
               <a:ext uri="{91240B29-F687-4f45-9708-019B960494DF}">
-                <a14:hiddenLine xmlns="" xmlns:a14="http://schemas.microsoft.com/office/drawing/2010/main" w="9525">
+                <a14:hiddenLine xmlns:a14="http://schemas.microsoft.com/office/drawing/2010/main" xmlns="" w="9525">
                   <a:solidFill>
                     <a:srgbClr val="000000"/>
                   </a:solidFill>
@@ -3870,7 +3871,7 @@
             </a:ln>
             <a:extLst>
               <a:ext uri="{91240B29-F687-4f45-9708-019B960494DF}">
-                <a14:hiddenLine xmlns="" xmlns:a14="http://schemas.microsoft.com/office/drawing/2010/main" w="9525">
+                <a14:hiddenLine xmlns:a14="http://schemas.microsoft.com/office/drawing/2010/main" xmlns="" w="9525">
                   <a:solidFill>
                     <a:srgbClr val="000000"/>
                   </a:solidFill>
@@ -3960,7 +3961,7 @@
             </a:ln>
             <a:extLst>
               <a:ext uri="{91240B29-F687-4f45-9708-019B960494DF}">
-                <a14:hiddenLine xmlns="" xmlns:a14="http://schemas.microsoft.com/office/drawing/2010/main" w="9525">
+                <a14:hiddenLine xmlns:a14="http://schemas.microsoft.com/office/drawing/2010/main" xmlns="" w="9525">
                   <a:solidFill>
                     <a:srgbClr val="000000"/>
                   </a:solidFill>
@@ -4022,7 +4023,7 @@
             </a:ln>
             <a:extLst>
               <a:ext uri="{91240B29-F687-4f45-9708-019B960494DF}">
-                <a14:hiddenLine xmlns="" xmlns:a14="http://schemas.microsoft.com/office/drawing/2010/main" w="9525">
+                <a14:hiddenLine xmlns:a14="http://schemas.microsoft.com/office/drawing/2010/main" xmlns="" w="9525">
                   <a:solidFill>
                     <a:srgbClr val="000000"/>
                   </a:solidFill>
@@ -4142,7 +4143,7 @@
             </a:ln>
             <a:extLst>
               <a:ext uri="{91240B29-F687-4f45-9708-019B960494DF}">
-                <a14:hiddenLine xmlns="" xmlns:a14="http://schemas.microsoft.com/office/drawing/2010/main" w="9525">
+                <a14:hiddenLine xmlns:a14="http://schemas.microsoft.com/office/drawing/2010/main" xmlns="" w="9525">
                   <a:solidFill>
                     <a:srgbClr val="000000"/>
                   </a:solidFill>
@@ -4210,7 +4211,7 @@
             </a:ln>
             <a:extLst>
               <a:ext uri="{91240B29-F687-4f45-9708-019B960494DF}">
-                <a14:hiddenLine xmlns="" xmlns:a14="http://schemas.microsoft.com/office/drawing/2010/main" w="9525">
+                <a14:hiddenLine xmlns:a14="http://schemas.microsoft.com/office/drawing/2010/main" xmlns="" w="9525">
                   <a:solidFill>
                     <a:srgbClr val="000000"/>
                   </a:solidFill>
@@ -4300,7 +4301,7 @@
             </a:ln>
             <a:extLst>
               <a:ext uri="{91240B29-F687-4f45-9708-019B960494DF}">
-                <a14:hiddenLine xmlns="" xmlns:a14="http://schemas.microsoft.com/office/drawing/2010/main" w="9525">
+                <a14:hiddenLine xmlns:a14="http://schemas.microsoft.com/office/drawing/2010/main" xmlns="" w="9525">
                   <a:solidFill>
                     <a:srgbClr val="000000"/>
                   </a:solidFill>
@@ -4440,7 +4441,7 @@
           <a:p>
             <a:fld id="{951AF1EB-82F2-4C84-AADB-635468081963}" type="datetimeFigureOut">
               <a:rPr lang="en-US" smtClean="0"/>
-              <a:t>01/08/2022</a:t>
+              <a:t>03/08/2022</a:t>
             </a:fld>
             <a:endParaRPr lang="en-US"/>
           </a:p>
@@ -4707,7 +4708,7 @@
           <a:p>
             <a:fld id="{951AF1EB-82F2-4C84-AADB-635468081963}" type="datetimeFigureOut">
               <a:rPr lang="en-US" smtClean="0"/>
-              <a:t>01/08/2022</a:t>
+              <a:t>03/08/2022</a:t>
             </a:fld>
             <a:endParaRPr lang="en-US"/>
           </a:p>
@@ -4903,7 +4904,7 @@
           <a:p>
             <a:fld id="{951AF1EB-82F2-4C84-AADB-635468081963}" type="datetimeFigureOut">
               <a:rPr lang="en-US" smtClean="0"/>
-              <a:t>01/08/2022</a:t>
+              <a:t>03/08/2022</a:t>
             </a:fld>
             <a:endParaRPr lang="en-US"/>
           </a:p>
@@ -5166,7 +5167,7 @@
           <a:p>
             <a:fld id="{951AF1EB-82F2-4C84-AADB-635468081963}" type="datetimeFigureOut">
               <a:rPr lang="en-US" smtClean="0"/>
-              <a:t>01/08/2022</a:t>
+              <a:t>03/08/2022</a:t>
             </a:fld>
             <a:endParaRPr lang="en-US"/>
           </a:p>
@@ -5600,7 +5601,7 @@
           <a:p>
             <a:fld id="{951AF1EB-82F2-4C84-AADB-635468081963}" type="datetimeFigureOut">
               <a:rPr lang="en-US" smtClean="0"/>
-              <a:t>01/08/2022</a:t>
+              <a:t>03/08/2022</a:t>
             </a:fld>
             <a:endParaRPr lang="en-US"/>
           </a:p>
@@ -6146,7 +6147,7 @@
           <a:p>
             <a:fld id="{951AF1EB-82F2-4C84-AADB-635468081963}" type="datetimeFigureOut">
               <a:rPr lang="en-US" smtClean="0"/>
-              <a:t>01/08/2022</a:t>
+              <a:t>03/08/2022</a:t>
             </a:fld>
             <a:endParaRPr lang="en-US"/>
           </a:p>
@@ -6866,7 +6867,7 @@
           <a:p>
             <a:fld id="{951AF1EB-82F2-4C84-AADB-635468081963}" type="datetimeFigureOut">
               <a:rPr lang="en-US" smtClean="0"/>
-              <a:t>01/08/2022</a:t>
+              <a:t>03/08/2022</a:t>
             </a:fld>
             <a:endParaRPr lang="en-US"/>
           </a:p>
@@ -7036,7 +7037,7 @@
           <a:p>
             <a:fld id="{951AF1EB-82F2-4C84-AADB-635468081963}" type="datetimeFigureOut">
               <a:rPr lang="en-US" smtClean="0"/>
-              <a:t>01/08/2022</a:t>
+              <a:t>03/08/2022</a:t>
             </a:fld>
             <a:endParaRPr lang="en-US"/>
           </a:p>
@@ -7216,7 +7217,7 @@
           <a:p>
             <a:fld id="{951AF1EB-82F2-4C84-AADB-635468081963}" type="datetimeFigureOut">
               <a:rPr lang="en-US" smtClean="0"/>
-              <a:t>01/08/2022</a:t>
+              <a:t>03/08/2022</a:t>
             </a:fld>
             <a:endParaRPr lang="en-US"/>
           </a:p>
@@ -7386,7 +7387,7 @@
           <a:p>
             <a:fld id="{951AF1EB-82F2-4C84-AADB-635468081963}" type="datetimeFigureOut">
               <a:rPr lang="en-US" smtClean="0"/>
-              <a:t>01/08/2022</a:t>
+              <a:t>03/08/2022</a:t>
             </a:fld>
             <a:endParaRPr lang="en-US"/>
           </a:p>
@@ -7636,7 +7637,7 @@
           <a:p>
             <a:fld id="{951AF1EB-82F2-4C84-AADB-635468081963}" type="datetimeFigureOut">
               <a:rPr lang="en-US" smtClean="0"/>
-              <a:t>01/08/2022</a:t>
+              <a:t>03/08/2022</a:t>
             </a:fld>
             <a:endParaRPr lang="en-US"/>
           </a:p>
@@ -7868,7 +7869,7 @@
           <a:p>
             <a:fld id="{951AF1EB-82F2-4C84-AADB-635468081963}" type="datetimeFigureOut">
               <a:rPr lang="en-US" smtClean="0"/>
-              <a:t>01/08/2022</a:t>
+              <a:t>03/08/2022</a:t>
             </a:fld>
             <a:endParaRPr lang="en-US"/>
           </a:p>
@@ -8249,7 +8250,7 @@
           <a:p>
             <a:fld id="{951AF1EB-82F2-4C84-AADB-635468081963}" type="datetimeFigureOut">
               <a:rPr lang="en-US" smtClean="0"/>
-              <a:t>01/08/2022</a:t>
+              <a:t>03/08/2022</a:t>
             </a:fld>
             <a:endParaRPr lang="en-US"/>
           </a:p>
@@ -8367,7 +8368,7 @@
           <a:p>
             <a:fld id="{951AF1EB-82F2-4C84-AADB-635468081963}" type="datetimeFigureOut">
               <a:rPr lang="en-US" smtClean="0"/>
-              <a:t>01/08/2022</a:t>
+              <a:t>03/08/2022</a:t>
             </a:fld>
             <a:endParaRPr lang="en-US"/>
           </a:p>
@@ -8462,7 +8463,7 @@
           <a:p>
             <a:fld id="{951AF1EB-82F2-4C84-AADB-635468081963}" type="datetimeFigureOut">
               <a:rPr lang="en-US" smtClean="0"/>
-              <a:t>01/08/2022</a:t>
+              <a:t>03/08/2022</a:t>
             </a:fld>
             <a:endParaRPr lang="en-US"/>
           </a:p>
@@ -8711,7 +8712,7 @@
           <a:p>
             <a:fld id="{951AF1EB-82F2-4C84-AADB-635468081963}" type="datetimeFigureOut">
               <a:rPr lang="en-US" smtClean="0"/>
-              <a:t>01/08/2022</a:t>
+              <a:t>03/08/2022</a:t>
             </a:fld>
             <a:endParaRPr lang="en-US"/>
           </a:p>
@@ -8991,7 +8992,7 @@
           <a:p>
             <a:fld id="{951AF1EB-82F2-4C84-AADB-635468081963}" type="datetimeFigureOut">
               <a:rPr lang="en-US" smtClean="0"/>
-              <a:t>01/08/2022</a:t>
+              <a:t>03/08/2022</a:t>
             </a:fld>
             <a:endParaRPr lang="en-US"/>
           </a:p>
@@ -9107,7 +9108,7 @@
           <a:noFill/>
           <a:extLst>
             <a:ext uri="{909E8E84-426E-40dd-AFC4-6F175D3DCCD1}">
-              <a14:hiddenFill xmlns="" xmlns:a14="http://schemas.microsoft.com/office/drawing/2010/main">
+              <a14:hiddenFill xmlns:a14="http://schemas.microsoft.com/office/drawing/2010/main" xmlns="">
                 <a:solidFill>
                   <a:srgbClr val="FFFFFF"/>
                 </a:solidFill>
@@ -9181,7 +9182,7 @@
               </a:ln>
               <a:extLst>
                 <a:ext uri="{91240B29-F687-4f45-9708-019B960494DF}">
-                  <a14:hiddenLine xmlns="" xmlns:a14="http://schemas.microsoft.com/office/drawing/2010/main" w="9525">
+                  <a14:hiddenLine xmlns:a14="http://schemas.microsoft.com/office/drawing/2010/main" xmlns="" w="9525">
                     <a:solidFill>
                       <a:srgbClr val="000000"/>
                     </a:solidFill>
@@ -9271,7 +9272,7 @@
               </a:ln>
               <a:extLst>
                 <a:ext uri="{91240B29-F687-4f45-9708-019B960494DF}">
-                  <a14:hiddenLine xmlns="" xmlns:a14="http://schemas.microsoft.com/office/drawing/2010/main" w="9525">
+                  <a14:hiddenLine xmlns:a14="http://schemas.microsoft.com/office/drawing/2010/main" xmlns="" w="9525">
                     <a:solidFill>
                       <a:srgbClr val="000000"/>
                     </a:solidFill>
@@ -9361,7 +9362,7 @@
               </a:ln>
               <a:extLst>
                 <a:ext uri="{91240B29-F687-4f45-9708-019B960494DF}">
-                  <a14:hiddenLine xmlns="" xmlns:a14="http://schemas.microsoft.com/office/drawing/2010/main" w="9525">
+                  <a14:hiddenLine xmlns:a14="http://schemas.microsoft.com/office/drawing/2010/main" xmlns="" w="9525">
                     <a:solidFill>
                       <a:srgbClr val="000000"/>
                     </a:solidFill>
@@ -9423,7 +9424,7 @@
               </a:ln>
               <a:extLst>
                 <a:ext uri="{91240B29-F687-4f45-9708-019B960494DF}">
-                  <a14:hiddenLine xmlns="" xmlns:a14="http://schemas.microsoft.com/office/drawing/2010/main" w="9525">
+                  <a14:hiddenLine xmlns:a14="http://schemas.microsoft.com/office/drawing/2010/main" xmlns="" w="9525">
                     <a:solidFill>
                       <a:srgbClr val="000000"/>
                     </a:solidFill>
@@ -9513,7 +9514,7 @@
               </a:ln>
               <a:extLst>
                 <a:ext uri="{91240B29-F687-4f45-9708-019B960494DF}">
-                  <a14:hiddenLine xmlns="" xmlns:a14="http://schemas.microsoft.com/office/drawing/2010/main" w="9525">
+                  <a14:hiddenLine xmlns:a14="http://schemas.microsoft.com/office/drawing/2010/main" xmlns="" w="9525">
                     <a:solidFill>
                       <a:srgbClr val="000000"/>
                     </a:solidFill>
@@ -9575,7 +9576,7 @@
               </a:ln>
               <a:extLst>
                 <a:ext uri="{91240B29-F687-4f45-9708-019B960494DF}">
-                  <a14:hiddenLine xmlns="" xmlns:a14="http://schemas.microsoft.com/office/drawing/2010/main" w="9525">
+                  <a14:hiddenLine xmlns:a14="http://schemas.microsoft.com/office/drawing/2010/main" xmlns="" w="9525">
                     <a:solidFill>
                       <a:srgbClr val="000000"/>
                     </a:solidFill>
@@ -9637,7 +9638,7 @@
               </a:ln>
               <a:extLst>
                 <a:ext uri="{91240B29-F687-4f45-9708-019B960494DF}">
-                  <a14:hiddenLine xmlns="" xmlns:a14="http://schemas.microsoft.com/office/drawing/2010/main" w="9525">
+                  <a14:hiddenLine xmlns:a14="http://schemas.microsoft.com/office/drawing/2010/main" xmlns="" w="9525">
                     <a:solidFill>
                       <a:srgbClr val="000000"/>
                     </a:solidFill>
@@ -9727,7 +9728,7 @@
               </a:ln>
               <a:extLst>
                 <a:ext uri="{91240B29-F687-4f45-9708-019B960494DF}">
-                  <a14:hiddenLine xmlns="" xmlns:a14="http://schemas.microsoft.com/office/drawing/2010/main" w="9525">
+                  <a14:hiddenLine xmlns:a14="http://schemas.microsoft.com/office/drawing/2010/main" xmlns="" w="9525">
                     <a:solidFill>
                       <a:srgbClr val="000000"/>
                     </a:solidFill>
@@ -9817,7 +9818,7 @@
               </a:ln>
               <a:extLst>
                 <a:ext uri="{91240B29-F687-4f45-9708-019B960494DF}">
-                  <a14:hiddenLine xmlns="" xmlns:a14="http://schemas.microsoft.com/office/drawing/2010/main" w="9525">
+                  <a14:hiddenLine xmlns:a14="http://schemas.microsoft.com/office/drawing/2010/main" xmlns="" w="9525">
                     <a:solidFill>
                       <a:srgbClr val="000000"/>
                     </a:solidFill>
@@ -9879,7 +9880,7 @@
               </a:ln>
               <a:extLst>
                 <a:ext uri="{91240B29-F687-4f45-9708-019B960494DF}">
-                  <a14:hiddenLine xmlns="" xmlns:a14="http://schemas.microsoft.com/office/drawing/2010/main" w="9525">
+                  <a14:hiddenLine xmlns:a14="http://schemas.microsoft.com/office/drawing/2010/main" xmlns="" w="9525">
                     <a:solidFill>
                       <a:srgbClr val="000000"/>
                     </a:solidFill>
@@ -9989,7 +9990,7 @@
               </a:ln>
               <a:extLst>
                 <a:ext uri="{91240B29-F687-4f45-9708-019B960494DF}">
-                  <a14:hiddenLine xmlns="" xmlns:a14="http://schemas.microsoft.com/office/drawing/2010/main" w="9525">
+                  <a14:hiddenLine xmlns:a14="http://schemas.microsoft.com/office/drawing/2010/main" xmlns="" w="9525">
                     <a:solidFill>
                       <a:srgbClr val="000000"/>
                     </a:solidFill>
@@ -10073,7 +10074,7 @@
               </a:ln>
               <a:extLst>
                 <a:ext uri="{91240B29-F687-4f45-9708-019B960494DF}">
-                  <a14:hiddenLine xmlns="" xmlns:a14="http://schemas.microsoft.com/office/drawing/2010/main" w="9525">
+                  <a14:hiddenLine xmlns:a14="http://schemas.microsoft.com/office/drawing/2010/main" xmlns="" w="9525">
                     <a:solidFill>
                       <a:srgbClr val="000000"/>
                     </a:solidFill>
@@ -10135,7 +10136,7 @@
               </a:ln>
               <a:extLst>
                 <a:ext uri="{91240B29-F687-4f45-9708-019B960494DF}">
-                  <a14:hiddenLine xmlns="" xmlns:a14="http://schemas.microsoft.com/office/drawing/2010/main" w="9525">
+                  <a14:hiddenLine xmlns:a14="http://schemas.microsoft.com/office/drawing/2010/main" xmlns="" w="9525">
                     <a:solidFill>
                       <a:srgbClr val="000000"/>
                     </a:solidFill>
@@ -10197,7 +10198,7 @@
               </a:ln>
               <a:extLst>
                 <a:ext uri="{91240B29-F687-4f45-9708-019B960494DF}">
-                  <a14:hiddenLine xmlns="" xmlns:a14="http://schemas.microsoft.com/office/drawing/2010/main" w="9525">
+                  <a14:hiddenLine xmlns:a14="http://schemas.microsoft.com/office/drawing/2010/main" xmlns="" w="9525">
                     <a:solidFill>
                       <a:srgbClr val="000000"/>
                     </a:solidFill>
@@ -10287,7 +10288,7 @@
               </a:ln>
               <a:extLst>
                 <a:ext uri="{91240B29-F687-4f45-9708-019B960494DF}">
-                  <a14:hiddenLine xmlns="" xmlns:a14="http://schemas.microsoft.com/office/drawing/2010/main" w="9525">
+                  <a14:hiddenLine xmlns:a14="http://schemas.microsoft.com/office/drawing/2010/main" xmlns="" w="9525">
                     <a:solidFill>
                       <a:srgbClr val="000000"/>
                     </a:solidFill>
@@ -10321,7 +10322,7 @@
               </a:ln>
               <a:extLst>
                 <a:ext uri="{91240B29-F687-4f45-9708-019B960494DF}">
-                  <a14:hiddenLine xmlns="" xmlns:a14="http://schemas.microsoft.com/office/drawing/2010/main" w="9525">
+                  <a14:hiddenLine xmlns:a14="http://schemas.microsoft.com/office/drawing/2010/main" xmlns="" w="9525">
                     <a:solidFill>
                       <a:srgbClr val="000000"/>
                     </a:solidFill>
@@ -10386,7 +10387,7 @@
               </a:ln>
               <a:extLst>
                 <a:ext uri="{91240B29-F687-4f45-9708-019B960494DF}">
-                  <a14:hiddenLine xmlns="" xmlns:a14="http://schemas.microsoft.com/office/drawing/2010/main" w="9525">
+                  <a14:hiddenLine xmlns:a14="http://schemas.microsoft.com/office/drawing/2010/main" xmlns="" w="9525">
                     <a:solidFill>
                       <a:srgbClr val="000000"/>
                     </a:solidFill>
@@ -10476,7 +10477,7 @@
               </a:ln>
               <a:extLst>
                 <a:ext uri="{91240B29-F687-4f45-9708-019B960494DF}">
-                  <a14:hiddenLine xmlns="" xmlns:a14="http://schemas.microsoft.com/office/drawing/2010/main" w="9525">
+                  <a14:hiddenLine xmlns:a14="http://schemas.microsoft.com/office/drawing/2010/main" xmlns="" w="9525">
                     <a:solidFill>
                       <a:srgbClr val="000000"/>
                     </a:solidFill>
@@ -10538,7 +10539,7 @@
               </a:ln>
               <a:extLst>
                 <a:ext uri="{91240B29-F687-4f45-9708-019B960494DF}">
-                  <a14:hiddenLine xmlns="" xmlns:a14="http://schemas.microsoft.com/office/drawing/2010/main" w="9525">
+                  <a14:hiddenLine xmlns:a14="http://schemas.microsoft.com/office/drawing/2010/main" xmlns="" w="9525">
                     <a:solidFill>
                       <a:srgbClr val="000000"/>
                     </a:solidFill>
@@ -10628,7 +10629,7 @@
               </a:ln>
               <a:extLst>
                 <a:ext uri="{91240B29-F687-4f45-9708-019B960494DF}">
-                  <a14:hiddenLine xmlns="" xmlns:a14="http://schemas.microsoft.com/office/drawing/2010/main" w="9525">
+                  <a14:hiddenLine xmlns:a14="http://schemas.microsoft.com/office/drawing/2010/main" xmlns="" w="9525">
                     <a:solidFill>
                       <a:srgbClr val="000000"/>
                     </a:solidFill>
@@ -10693,7 +10694,7 @@
               </a:ln>
               <a:extLst>
                 <a:ext uri="{91240B29-F687-4f45-9708-019B960494DF}">
-                  <a14:hiddenLine xmlns="" xmlns:a14="http://schemas.microsoft.com/office/drawing/2010/main" w="9525">
+                  <a14:hiddenLine xmlns:a14="http://schemas.microsoft.com/office/drawing/2010/main" xmlns="" w="9525">
                     <a:solidFill>
                       <a:srgbClr val="000000"/>
                     </a:solidFill>
@@ -10755,7 +10756,7 @@
               </a:ln>
               <a:extLst>
                 <a:ext uri="{91240B29-F687-4f45-9708-019B960494DF}">
-                  <a14:hiddenLine xmlns="" xmlns:a14="http://schemas.microsoft.com/office/drawing/2010/main" w="9525">
+                  <a14:hiddenLine xmlns:a14="http://schemas.microsoft.com/office/drawing/2010/main" xmlns="" w="9525">
                     <a:solidFill>
                       <a:srgbClr val="000000"/>
                     </a:solidFill>
@@ -10845,7 +10846,7 @@
               </a:ln>
               <a:extLst>
                 <a:ext uri="{91240B29-F687-4f45-9708-019B960494DF}">
-                  <a14:hiddenLine xmlns="" xmlns:a14="http://schemas.microsoft.com/office/drawing/2010/main" w="9525">
+                  <a14:hiddenLine xmlns:a14="http://schemas.microsoft.com/office/drawing/2010/main" xmlns="" w="9525">
                     <a:solidFill>
                       <a:srgbClr val="000000"/>
                     </a:solidFill>
@@ -10935,7 +10936,7 @@
               </a:ln>
               <a:extLst>
                 <a:ext uri="{91240B29-F687-4f45-9708-019B960494DF}">
-                  <a14:hiddenLine xmlns="" xmlns:a14="http://schemas.microsoft.com/office/drawing/2010/main" w="9525">
+                  <a14:hiddenLine xmlns:a14="http://schemas.microsoft.com/office/drawing/2010/main" xmlns="" w="9525">
                     <a:solidFill>
                       <a:srgbClr val="000000"/>
                     </a:solidFill>
@@ -11000,7 +11001,7 @@
               </a:ln>
               <a:extLst>
                 <a:ext uri="{91240B29-F687-4f45-9708-019B960494DF}">
-                  <a14:hiddenLine xmlns="" xmlns:a14="http://schemas.microsoft.com/office/drawing/2010/main" w="9525">
+                  <a14:hiddenLine xmlns:a14="http://schemas.microsoft.com/office/drawing/2010/main" xmlns="" w="9525">
                     <a:solidFill>
                       <a:srgbClr val="000000"/>
                     </a:solidFill>
@@ -11120,7 +11121,7 @@
               </a:ln>
               <a:extLst>
                 <a:ext uri="{91240B29-F687-4f45-9708-019B960494DF}">
-                  <a14:hiddenLine xmlns="" xmlns:a14="http://schemas.microsoft.com/office/drawing/2010/main" w="9525">
+                  <a14:hiddenLine xmlns:a14="http://schemas.microsoft.com/office/drawing/2010/main" xmlns="" w="9525">
                     <a:solidFill>
                       <a:srgbClr val="000000"/>
                     </a:solidFill>
@@ -11218,7 +11219,7 @@
               </a:ln>
               <a:extLst>
                 <a:ext uri="{91240B29-F687-4f45-9708-019B960494DF}">
-                  <a14:hiddenLine xmlns="" xmlns:a14="http://schemas.microsoft.com/office/drawing/2010/main" w="9525">
+                  <a14:hiddenLine xmlns:a14="http://schemas.microsoft.com/office/drawing/2010/main" xmlns="" w="9525">
                     <a:solidFill>
                       <a:srgbClr val="000000"/>
                     </a:solidFill>
@@ -11333,7 +11334,7 @@
               </a:ln>
               <a:extLst>
                 <a:ext uri="{91240B29-F687-4f45-9708-019B960494DF}">
-                  <a14:hiddenLine xmlns="" xmlns:a14="http://schemas.microsoft.com/office/drawing/2010/main" w="9525">
+                  <a14:hiddenLine xmlns:a14="http://schemas.microsoft.com/office/drawing/2010/main" xmlns="" w="9525">
                     <a:solidFill>
                       <a:srgbClr val="000000"/>
                     </a:solidFill>
@@ -11423,7 +11424,7 @@
               </a:ln>
               <a:extLst>
                 <a:ext uri="{91240B29-F687-4f45-9708-019B960494DF}">
-                  <a14:hiddenLine xmlns="" xmlns:a14="http://schemas.microsoft.com/office/drawing/2010/main" w="9525">
+                  <a14:hiddenLine xmlns:a14="http://schemas.microsoft.com/office/drawing/2010/main" xmlns="" w="9525">
                     <a:solidFill>
                       <a:srgbClr val="000000"/>
                     </a:solidFill>
@@ -11488,7 +11489,7 @@
               </a:ln>
               <a:extLst>
                 <a:ext uri="{91240B29-F687-4f45-9708-019B960494DF}">
-                  <a14:hiddenLine xmlns="" xmlns:a14="http://schemas.microsoft.com/office/drawing/2010/main" w="9525">
+                  <a14:hiddenLine xmlns:a14="http://schemas.microsoft.com/office/drawing/2010/main" xmlns="" w="9525">
                     <a:solidFill>
                       <a:srgbClr val="000000"/>
                     </a:solidFill>
@@ -11578,7 +11579,7 @@
               </a:ln>
               <a:extLst>
                 <a:ext uri="{91240B29-F687-4f45-9708-019B960494DF}">
-                  <a14:hiddenLine xmlns="" xmlns:a14="http://schemas.microsoft.com/office/drawing/2010/main" w="9525">
+                  <a14:hiddenLine xmlns:a14="http://schemas.microsoft.com/office/drawing/2010/main" xmlns="" w="9525">
                     <a:solidFill>
                       <a:srgbClr val="000000"/>
                     </a:solidFill>
@@ -11646,7 +11647,7 @@
               </a:ln>
               <a:extLst>
                 <a:ext uri="{91240B29-F687-4f45-9708-019B960494DF}">
-                  <a14:hiddenLine xmlns="" xmlns:a14="http://schemas.microsoft.com/office/drawing/2010/main" w="9525">
+                  <a14:hiddenLine xmlns:a14="http://schemas.microsoft.com/office/drawing/2010/main" xmlns="" w="9525">
                     <a:solidFill>
                       <a:srgbClr val="000000"/>
                     </a:solidFill>
@@ -11736,7 +11737,7 @@
               </a:ln>
               <a:extLst>
                 <a:ext uri="{91240B29-F687-4f45-9708-019B960494DF}">
-                  <a14:hiddenLine xmlns="" xmlns:a14="http://schemas.microsoft.com/office/drawing/2010/main" w="9525">
+                  <a14:hiddenLine xmlns:a14="http://schemas.microsoft.com/office/drawing/2010/main" xmlns="" w="9525">
                     <a:solidFill>
                       <a:srgbClr val="000000"/>
                     </a:solidFill>
@@ -11804,7 +11805,7 @@
               </a:ln>
               <a:extLst>
                 <a:ext uri="{91240B29-F687-4f45-9708-019B960494DF}">
-                  <a14:hiddenLine xmlns="" xmlns:a14="http://schemas.microsoft.com/office/drawing/2010/main" w="9525">
+                  <a14:hiddenLine xmlns:a14="http://schemas.microsoft.com/office/drawing/2010/main" xmlns="" w="9525">
                     <a:solidFill>
                       <a:srgbClr val="000000"/>
                     </a:solidFill>
@@ -11894,7 +11895,7 @@
               </a:ln>
               <a:extLst>
                 <a:ext uri="{91240B29-F687-4f45-9708-019B960494DF}">
-                  <a14:hiddenLine xmlns="" xmlns:a14="http://schemas.microsoft.com/office/drawing/2010/main" w="9525">
+                  <a14:hiddenLine xmlns:a14="http://schemas.microsoft.com/office/drawing/2010/main" xmlns="" w="9525">
                     <a:solidFill>
                       <a:srgbClr val="000000"/>
                     </a:solidFill>
@@ -11928,7 +11929,7 @@
               </a:ln>
               <a:extLst>
                 <a:ext uri="{91240B29-F687-4f45-9708-019B960494DF}">
-                  <a14:hiddenLine xmlns="" xmlns:a14="http://schemas.microsoft.com/office/drawing/2010/main" w="9525">
+                  <a14:hiddenLine xmlns:a14="http://schemas.microsoft.com/office/drawing/2010/main" xmlns="" w="9525">
                     <a:solidFill>
                       <a:srgbClr val="000000"/>
                     </a:solidFill>
@@ -12068,7 +12069,7 @@
           <a:p>
             <a:fld id="{951AF1EB-82F2-4C84-AADB-635468081963}" type="datetimeFigureOut">
               <a:rPr lang="en-US" smtClean="0"/>
-              <a:t>01/08/2022</a:t>
+              <a:t>03/08/2022</a:t>
             </a:fld>
             <a:endParaRPr lang="en-US"/>
           </a:p>
@@ -17428,10 +17429,9 @@
           </a:p>
           <a:p>
             <a:r>
-              <a:rPr lang="en-US"/>
+              <a:rPr lang="en-US" dirty="0"/>
               <a:t>else error</a:t>
             </a:r>
-            <a:endParaRPr lang="en-US" dirty="0"/>
           </a:p>
           <a:p>
             <a:pPr lvl="2"/>
@@ -17443,6 +17443,175 @@
     <p:extLst>
       <p:ext uri="{BB962C8B-B14F-4D97-AF65-F5344CB8AC3E}">
         <p14:creationId xmlns:p14="http://schemas.microsoft.com/office/powerpoint/2010/main" val="921667215"/>
+      </p:ext>
+    </p:extLst>
+  </p:cSld>
+  <p:clrMapOvr>
+    <a:masterClrMapping/>
+  </p:clrMapOvr>
+</p:sld>
+</file>
+
+<file path=ppt/slides/slide43.xml><?xml version="1.0" encoding="utf-8"?>
+<p:sld xmlns:a="http://schemas.openxmlformats.org/drawingml/2006/main" xmlns:r="http://schemas.openxmlformats.org/officeDocument/2006/relationships" xmlns:p="http://schemas.openxmlformats.org/presentationml/2006/main">
+  <p:cSld>
+    <p:spTree>
+      <p:nvGrpSpPr>
+        <p:cNvPr id="1" name=""/>
+        <p:cNvGrpSpPr/>
+        <p:nvPr/>
+      </p:nvGrpSpPr>
+      <p:grpSpPr>
+        <a:xfrm>
+          <a:off x="0" y="0"/>
+          <a:ext cx="0" cy="0"/>
+          <a:chOff x="0" y="0"/>
+          <a:chExt cx="0" cy="0"/>
+        </a:xfrm>
+      </p:grpSpPr>
+      <p:sp>
+        <p:nvSpPr>
+          <p:cNvPr id="2" name="Title 1">
+            <a:extLst>
+              <a:ext uri="{FF2B5EF4-FFF2-40B4-BE49-F238E27FC236}">
+                <a16:creationId xmlns:a16="http://schemas.microsoft.com/office/drawing/2014/main" id="{7536A5A0-6A70-C7CE-1030-952992936583}"/>
+              </a:ext>
+            </a:extLst>
+          </p:cNvPr>
+          <p:cNvSpPr>
+            <a:spLocks noGrp="1"/>
+          </p:cNvSpPr>
+          <p:nvPr>
+            <p:ph type="title"/>
+          </p:nvPr>
+        </p:nvSpPr>
+        <p:spPr/>
+        <p:txBody>
+          <a:bodyPr/>
+          <a:lstStyle/>
+          <a:p>
+            <a:r>
+              <a:rPr lang="en-US" dirty="0"/>
+              <a:t>Forget password</a:t>
+            </a:r>
+          </a:p>
+        </p:txBody>
+      </p:sp>
+      <p:sp>
+        <p:nvSpPr>
+          <p:cNvPr id="3" name="Content Placeholder 2">
+            <a:extLst>
+              <a:ext uri="{FF2B5EF4-FFF2-40B4-BE49-F238E27FC236}">
+                <a16:creationId xmlns:a16="http://schemas.microsoft.com/office/drawing/2014/main" id="{9700354A-2391-DCDF-C79A-FF1F664814C0}"/>
+              </a:ext>
+            </a:extLst>
+          </p:cNvPr>
+          <p:cNvSpPr>
+            <a:spLocks noGrp="1"/>
+          </p:cNvSpPr>
+          <p:nvPr>
+            <p:ph idx="1"/>
+          </p:nvPr>
+        </p:nvSpPr>
+        <p:spPr/>
+        <p:txBody>
+          <a:bodyPr>
+            <a:normAutofit fontScale="92500" lnSpcReduction="10000"/>
+          </a:bodyPr>
+          <a:lstStyle/>
+          <a:p>
+            <a:r>
+              <a:rPr lang="en-US" dirty="0"/>
+              <a:t>create </a:t>
+            </a:r>
+            <a:r>
+              <a:rPr lang="en-US" dirty="0" err="1"/>
+              <a:t>api</a:t>
+            </a:r>
+            <a:endParaRPr lang="en-US" dirty="0"/>
+          </a:p>
+          <a:p>
+            <a:r>
+              <a:rPr lang="en-US" dirty="0"/>
+              <a:t>request method post</a:t>
+            </a:r>
+          </a:p>
+          <a:p>
+            <a:r>
+              <a:rPr lang="en-US" dirty="0"/>
+              <a:t>validate email</a:t>
+            </a:r>
+          </a:p>
+          <a:p>
+            <a:r>
+              <a:rPr lang="en-US" dirty="0"/>
+              <a:t>check if email exists in </a:t>
+            </a:r>
+            <a:r>
+              <a:rPr lang="en-US" dirty="0" err="1"/>
+              <a:t>db</a:t>
+            </a:r>
+            <a:endParaRPr lang="en-US" dirty="0"/>
+          </a:p>
+          <a:p>
+            <a:pPr lvl="1"/>
+            <a:r>
+              <a:rPr lang="en-US" dirty="0"/>
+              <a:t>if exists then </a:t>
+            </a:r>
+          </a:p>
+          <a:p>
+            <a:pPr lvl="2"/>
+            <a:r>
+              <a:rPr lang="en-US" dirty="0"/>
+              <a:t>generate secret key</a:t>
+            </a:r>
+          </a:p>
+          <a:p>
+            <a:pPr lvl="2"/>
+            <a:r>
+              <a:rPr lang="en-US" dirty="0"/>
+              <a:t>generate </a:t>
+            </a:r>
+            <a:r>
+              <a:rPr lang="en-US" dirty="0" err="1"/>
+              <a:t>url</a:t>
+            </a:r>
+            <a:r>
+              <a:rPr lang="en-US" dirty="0"/>
+              <a:t> with the key</a:t>
+            </a:r>
+          </a:p>
+          <a:p>
+            <a:pPr lvl="2"/>
+            <a:r>
+              <a:rPr lang="en-US" dirty="0"/>
+              <a:t>send the </a:t>
+            </a:r>
+            <a:r>
+              <a:rPr lang="en-US" dirty="0" err="1"/>
+              <a:t>url</a:t>
+            </a:r>
+            <a:r>
+              <a:rPr lang="en-US" dirty="0"/>
+              <a:t> </a:t>
+            </a:r>
+            <a:r>
+              <a:rPr lang="en-US"/>
+              <a:t>to the email</a:t>
+            </a:r>
+            <a:endParaRPr lang="en-US" dirty="0"/>
+          </a:p>
+          <a:p>
+            <a:pPr lvl="1"/>
+            <a:endParaRPr lang="en-US" dirty="0"/>
+          </a:p>
+        </p:txBody>
+      </p:sp>
+    </p:spTree>
+    <p:extLst>
+      <p:ext uri="{BB962C8B-B14F-4D97-AF65-F5344CB8AC3E}">
+        <p14:creationId xmlns:p14="http://schemas.microsoft.com/office/powerpoint/2010/main" val="755769838"/>
       </p:ext>
     </p:extLst>
   </p:cSld>

</xml_diff>

<commit_message>
products do not copy
</commit_message>
<xml_diff>
--- a/docs/node js.pptx
+++ b/docs/node js.pptx
@@ -56,6 +56,7 @@
     <p:sldId id="304" r:id="rId50"/>
     <p:sldId id="305" r:id="rId51"/>
     <p:sldId id="306" r:id="rId52"/>
+    <p:sldId id="307" r:id="rId53"/>
   </p:sldIdLst>
   <p:sldSz cx="12192000" cy="6858000"/>
   <p:notesSz cx="6858000" cy="9144000"/>
@@ -223,7 +224,7 @@
           <a:noFill/>
           <a:extLst>
             <a:ext uri="{909E8E84-426E-40dd-AFC4-6F175D3DCCD1}">
-              <a14:hiddenFill xmlns:a14="http://schemas.microsoft.com/office/drawing/2010/main" xmlns="">
+              <a14:hiddenFill xmlns="" xmlns:a14="http://schemas.microsoft.com/office/drawing/2010/main">
                 <a:solidFill>
                   <a:srgbClr val="FFFFFF"/>
                 </a:solidFill>
@@ -283,7 +284,7 @@
             </a:ln>
             <a:extLst>
               <a:ext uri="{91240B29-F687-4f45-9708-019B960494DF}">
-                <a14:hiddenLine xmlns:a14="http://schemas.microsoft.com/office/drawing/2010/main" xmlns="" w="9525">
+                <a14:hiddenLine xmlns="" xmlns:a14="http://schemas.microsoft.com/office/drawing/2010/main" w="9525">
                   <a:solidFill>
                     <a:srgbClr val="000000"/>
                   </a:solidFill>
@@ -373,7 +374,7 @@
             </a:ln>
             <a:extLst>
               <a:ext uri="{91240B29-F687-4f45-9708-019B960494DF}">
-                <a14:hiddenLine xmlns:a14="http://schemas.microsoft.com/office/drawing/2010/main" xmlns="" w="9525">
+                <a14:hiddenLine xmlns="" xmlns:a14="http://schemas.microsoft.com/office/drawing/2010/main" w="9525">
                   <a:solidFill>
                     <a:srgbClr val="000000"/>
                   </a:solidFill>
@@ -463,7 +464,7 @@
             </a:ln>
             <a:extLst>
               <a:ext uri="{91240B29-F687-4f45-9708-019B960494DF}">
-                <a14:hiddenLine xmlns:a14="http://schemas.microsoft.com/office/drawing/2010/main" xmlns="" w="9525">
+                <a14:hiddenLine xmlns="" xmlns:a14="http://schemas.microsoft.com/office/drawing/2010/main" w="9525">
                   <a:solidFill>
                     <a:srgbClr val="000000"/>
                   </a:solidFill>
@@ -497,7 +498,7 @@
             </a:ln>
             <a:extLst>
               <a:ext uri="{91240B29-F687-4f45-9708-019B960494DF}">
-                <a14:hiddenLine xmlns:a14="http://schemas.microsoft.com/office/drawing/2010/main" xmlns="" w="9525">
+                <a14:hiddenLine xmlns="" xmlns:a14="http://schemas.microsoft.com/office/drawing/2010/main" w="9525">
                   <a:solidFill>
                     <a:srgbClr val="000000"/>
                   </a:solidFill>
@@ -587,7 +588,7 @@
             </a:ln>
             <a:extLst>
               <a:ext uri="{91240B29-F687-4f45-9708-019B960494DF}">
-                <a14:hiddenLine xmlns:a14="http://schemas.microsoft.com/office/drawing/2010/main" xmlns="" w="9525">
+                <a14:hiddenLine xmlns="" xmlns:a14="http://schemas.microsoft.com/office/drawing/2010/main" w="9525">
                   <a:solidFill>
                     <a:srgbClr val="000000"/>
                   </a:solidFill>
@@ -649,7 +650,7 @@
             </a:ln>
             <a:extLst>
               <a:ext uri="{91240B29-F687-4f45-9708-019B960494DF}">
-                <a14:hiddenLine xmlns:a14="http://schemas.microsoft.com/office/drawing/2010/main" xmlns="" w="9525">
+                <a14:hiddenLine xmlns="" xmlns:a14="http://schemas.microsoft.com/office/drawing/2010/main" w="9525">
                   <a:solidFill>
                     <a:srgbClr val="000000"/>
                   </a:solidFill>
@@ -711,7 +712,7 @@
             </a:ln>
             <a:extLst>
               <a:ext uri="{91240B29-F687-4f45-9708-019B960494DF}">
-                <a14:hiddenLine xmlns:a14="http://schemas.microsoft.com/office/drawing/2010/main" xmlns="" w="9525">
+                <a14:hiddenLine xmlns="" xmlns:a14="http://schemas.microsoft.com/office/drawing/2010/main" w="9525">
                   <a:solidFill>
                     <a:srgbClr val="000000"/>
                   </a:solidFill>
@@ -801,7 +802,7 @@
             </a:ln>
             <a:extLst>
               <a:ext uri="{91240B29-F687-4f45-9708-019B960494DF}">
-                <a14:hiddenLine xmlns:a14="http://schemas.microsoft.com/office/drawing/2010/main" xmlns="" w="9525">
+                <a14:hiddenLine xmlns="" xmlns:a14="http://schemas.microsoft.com/office/drawing/2010/main" w="9525">
                   <a:solidFill>
                     <a:srgbClr val="000000"/>
                   </a:solidFill>
@@ -863,7 +864,7 @@
             </a:ln>
             <a:extLst>
               <a:ext uri="{91240B29-F687-4f45-9708-019B960494DF}">
-                <a14:hiddenLine xmlns:a14="http://schemas.microsoft.com/office/drawing/2010/main" xmlns="" w="9525">
+                <a14:hiddenLine xmlns="" xmlns:a14="http://schemas.microsoft.com/office/drawing/2010/main" w="9525">
                   <a:solidFill>
                     <a:srgbClr val="000000"/>
                   </a:solidFill>
@@ -925,7 +926,7 @@
             </a:ln>
             <a:extLst>
               <a:ext uri="{91240B29-F687-4f45-9708-019B960494DF}">
-                <a14:hiddenLine xmlns:a14="http://schemas.microsoft.com/office/drawing/2010/main" xmlns="" w="9525">
+                <a14:hiddenLine xmlns="" xmlns:a14="http://schemas.microsoft.com/office/drawing/2010/main" w="9525">
                   <a:solidFill>
                     <a:srgbClr val="000000"/>
                   </a:solidFill>
@@ -1015,7 +1016,7 @@
             </a:ln>
             <a:extLst>
               <a:ext uri="{91240B29-F687-4f45-9708-019B960494DF}">
-                <a14:hiddenLine xmlns:a14="http://schemas.microsoft.com/office/drawing/2010/main" xmlns="" w="9525">
+                <a14:hiddenLine xmlns="" xmlns:a14="http://schemas.microsoft.com/office/drawing/2010/main" w="9525">
                   <a:solidFill>
                     <a:srgbClr val="000000"/>
                   </a:solidFill>
@@ -1105,7 +1106,7 @@
             </a:ln>
             <a:extLst>
               <a:ext uri="{91240B29-F687-4f45-9708-019B960494DF}">
-                <a14:hiddenLine xmlns:a14="http://schemas.microsoft.com/office/drawing/2010/main" xmlns="" w="9525">
+                <a14:hiddenLine xmlns="" xmlns:a14="http://schemas.microsoft.com/office/drawing/2010/main" w="9525">
                   <a:solidFill>
                     <a:srgbClr val="000000"/>
                   </a:solidFill>
@@ -1167,7 +1168,7 @@
             </a:ln>
             <a:extLst>
               <a:ext uri="{91240B29-F687-4f45-9708-019B960494DF}">
-                <a14:hiddenLine xmlns:a14="http://schemas.microsoft.com/office/drawing/2010/main" xmlns="" w="9525">
+                <a14:hiddenLine xmlns="" xmlns:a14="http://schemas.microsoft.com/office/drawing/2010/main" w="9525">
                   <a:solidFill>
                     <a:srgbClr val="000000"/>
                   </a:solidFill>
@@ -1277,7 +1278,7 @@
             </a:ln>
             <a:extLst>
               <a:ext uri="{91240B29-F687-4f45-9708-019B960494DF}">
-                <a14:hiddenLine xmlns:a14="http://schemas.microsoft.com/office/drawing/2010/main" xmlns="" w="9525">
+                <a14:hiddenLine xmlns="" xmlns:a14="http://schemas.microsoft.com/office/drawing/2010/main" w="9525">
                   <a:solidFill>
                     <a:srgbClr val="000000"/>
                   </a:solidFill>
@@ -1339,7 +1340,7 @@
             </a:ln>
             <a:extLst>
               <a:ext uri="{91240B29-F687-4f45-9708-019B960494DF}">
-                <a14:hiddenLine xmlns:a14="http://schemas.microsoft.com/office/drawing/2010/main" xmlns="" w="9525">
+                <a14:hiddenLine xmlns="" xmlns:a14="http://schemas.microsoft.com/office/drawing/2010/main" w="9525">
                   <a:solidFill>
                     <a:srgbClr val="000000"/>
                   </a:solidFill>
@@ -1429,7 +1430,7 @@
             </a:ln>
             <a:extLst>
               <a:ext uri="{91240B29-F687-4f45-9708-019B960494DF}">
-                <a14:hiddenLine xmlns:a14="http://schemas.microsoft.com/office/drawing/2010/main" xmlns="" w="9525">
+                <a14:hiddenLine xmlns="" xmlns:a14="http://schemas.microsoft.com/office/drawing/2010/main" w="9525">
                   <a:solidFill>
                     <a:srgbClr val="000000"/>
                   </a:solidFill>
@@ -1519,7 +1520,7 @@
             </a:ln>
             <a:extLst>
               <a:ext uri="{91240B29-F687-4f45-9708-019B960494DF}">
-                <a14:hiddenLine xmlns:a14="http://schemas.microsoft.com/office/drawing/2010/main" xmlns="" w="9525">
+                <a14:hiddenLine xmlns="" xmlns:a14="http://schemas.microsoft.com/office/drawing/2010/main" w="9525">
                   <a:solidFill>
                     <a:srgbClr val="000000"/>
                   </a:solidFill>
@@ -1581,7 +1582,7 @@
             </a:ln>
             <a:extLst>
               <a:ext uri="{91240B29-F687-4f45-9708-019B960494DF}">
-                <a14:hiddenLine xmlns:a14="http://schemas.microsoft.com/office/drawing/2010/main" xmlns="" w="9525">
+                <a14:hiddenLine xmlns="" xmlns:a14="http://schemas.microsoft.com/office/drawing/2010/main" w="9525">
                   <a:solidFill>
                     <a:srgbClr val="000000"/>
                   </a:solidFill>
@@ -1671,7 +1672,7 @@
             </a:ln>
             <a:extLst>
               <a:ext uri="{91240B29-F687-4f45-9708-019B960494DF}">
-                <a14:hiddenLine xmlns:a14="http://schemas.microsoft.com/office/drawing/2010/main" xmlns="" w="9525">
+                <a14:hiddenLine xmlns="" xmlns:a14="http://schemas.microsoft.com/office/drawing/2010/main" w="9525">
                   <a:solidFill>
                     <a:srgbClr val="000000"/>
                   </a:solidFill>
@@ -1761,7 +1762,7 @@
             </a:ln>
             <a:extLst>
               <a:ext uri="{91240B29-F687-4f45-9708-019B960494DF}">
-                <a14:hiddenLine xmlns:a14="http://schemas.microsoft.com/office/drawing/2010/main" xmlns="" w="9525">
+                <a14:hiddenLine xmlns="" xmlns:a14="http://schemas.microsoft.com/office/drawing/2010/main" w="9525">
                   <a:solidFill>
                     <a:srgbClr val="000000"/>
                   </a:solidFill>
@@ -1817,7 +1818,7 @@
             </a:ln>
             <a:extLst>
               <a:ext uri="{91240B29-F687-4f45-9708-019B960494DF}">
-                <a14:hiddenLine xmlns:a14="http://schemas.microsoft.com/office/drawing/2010/main" xmlns="" w="9525">
+                <a14:hiddenLine xmlns="" xmlns:a14="http://schemas.microsoft.com/office/drawing/2010/main" w="9525">
                   <a:solidFill>
                     <a:srgbClr val="000000"/>
                   </a:solidFill>
@@ -1907,7 +1908,7 @@
             </a:ln>
             <a:extLst>
               <a:ext uri="{91240B29-F687-4f45-9708-019B960494DF}">
-                <a14:hiddenLine xmlns:a14="http://schemas.microsoft.com/office/drawing/2010/main" xmlns="" w="9525">
+                <a14:hiddenLine xmlns="" xmlns:a14="http://schemas.microsoft.com/office/drawing/2010/main" w="9525">
                   <a:solidFill>
                     <a:srgbClr val="000000"/>
                   </a:solidFill>
@@ -1963,7 +1964,7 @@
             </a:ln>
             <a:extLst>
               <a:ext uri="{91240B29-F687-4f45-9708-019B960494DF}">
-                <a14:hiddenLine xmlns:a14="http://schemas.microsoft.com/office/drawing/2010/main" xmlns="" w="9525">
+                <a14:hiddenLine xmlns="" xmlns:a14="http://schemas.microsoft.com/office/drawing/2010/main" w="9525">
                   <a:solidFill>
                     <a:srgbClr val="000000"/>
                   </a:solidFill>
@@ -2053,7 +2054,7 @@
             </a:ln>
             <a:extLst>
               <a:ext uri="{91240B29-F687-4f45-9708-019B960494DF}">
-                <a14:hiddenLine xmlns:a14="http://schemas.microsoft.com/office/drawing/2010/main" xmlns="" w="9525">
+                <a14:hiddenLine xmlns="" xmlns:a14="http://schemas.microsoft.com/office/drawing/2010/main" w="9525">
                   <a:solidFill>
                     <a:srgbClr val="000000"/>
                   </a:solidFill>
@@ -2121,7 +2122,7 @@
             </a:ln>
             <a:extLst>
               <a:ext uri="{91240B29-F687-4f45-9708-019B960494DF}">
-                <a14:hiddenLine xmlns:a14="http://schemas.microsoft.com/office/drawing/2010/main" xmlns="" w="9525">
+                <a14:hiddenLine xmlns="" xmlns:a14="http://schemas.microsoft.com/office/drawing/2010/main" w="9525">
                   <a:solidFill>
                     <a:srgbClr val="000000"/>
                   </a:solidFill>
@@ -2211,7 +2212,7 @@
             </a:ln>
             <a:extLst>
               <a:ext uri="{91240B29-F687-4f45-9708-019B960494DF}">
-                <a14:hiddenLine xmlns:a14="http://schemas.microsoft.com/office/drawing/2010/main" xmlns="" w="9525">
+                <a14:hiddenLine xmlns="" xmlns:a14="http://schemas.microsoft.com/office/drawing/2010/main" w="9525">
                   <a:solidFill>
                     <a:srgbClr val="000000"/>
                   </a:solidFill>
@@ -2279,7 +2280,7 @@
             </a:ln>
             <a:extLst>
               <a:ext uri="{91240B29-F687-4f45-9708-019B960494DF}">
-                <a14:hiddenLine xmlns:a14="http://schemas.microsoft.com/office/drawing/2010/main" xmlns="" w="9525">
+                <a14:hiddenLine xmlns="" xmlns:a14="http://schemas.microsoft.com/office/drawing/2010/main" w="9525">
                   <a:solidFill>
                     <a:srgbClr val="000000"/>
                   </a:solidFill>
@@ -2369,7 +2370,7 @@
             </a:ln>
             <a:extLst>
               <a:ext uri="{91240B29-F687-4f45-9708-019B960494DF}">
-                <a14:hiddenLine xmlns:a14="http://schemas.microsoft.com/office/drawing/2010/main" xmlns="" w="9525">
+                <a14:hiddenLine xmlns="" xmlns:a14="http://schemas.microsoft.com/office/drawing/2010/main" w="9525">
                   <a:solidFill>
                     <a:srgbClr val="000000"/>
                   </a:solidFill>
@@ -2403,7 +2404,7 @@
             </a:ln>
             <a:extLst>
               <a:ext uri="{91240B29-F687-4f45-9708-019B960494DF}">
-                <a14:hiddenLine xmlns:a14="http://schemas.microsoft.com/office/drawing/2010/main" xmlns="" w="9525">
+                <a14:hiddenLine xmlns="" xmlns:a14="http://schemas.microsoft.com/office/drawing/2010/main" w="9525">
                   <a:solidFill>
                     <a:srgbClr val="000000"/>
                   </a:solidFill>
@@ -2493,7 +2494,7 @@
             </a:ln>
             <a:extLst>
               <a:ext uri="{91240B29-F687-4f45-9708-019B960494DF}">
-                <a14:hiddenLine xmlns:a14="http://schemas.microsoft.com/office/drawing/2010/main" xmlns="" w="9525">
+                <a14:hiddenLine xmlns="" xmlns:a14="http://schemas.microsoft.com/office/drawing/2010/main" w="9525">
                   <a:solidFill>
                     <a:srgbClr val="000000"/>
                   </a:solidFill>
@@ -2555,7 +2556,7 @@
             </a:ln>
             <a:extLst>
               <a:ext uri="{91240B29-F687-4f45-9708-019B960494DF}">
-                <a14:hiddenLine xmlns:a14="http://schemas.microsoft.com/office/drawing/2010/main" xmlns="" w="9525">
+                <a14:hiddenLine xmlns="" xmlns:a14="http://schemas.microsoft.com/office/drawing/2010/main" w="9525">
                   <a:solidFill>
                     <a:srgbClr val="000000"/>
                   </a:solidFill>
@@ -2617,7 +2618,7 @@
             </a:ln>
             <a:extLst>
               <a:ext uri="{91240B29-F687-4f45-9708-019B960494DF}">
-                <a14:hiddenLine xmlns:a14="http://schemas.microsoft.com/office/drawing/2010/main" xmlns="" w="9525">
+                <a14:hiddenLine xmlns="" xmlns:a14="http://schemas.microsoft.com/office/drawing/2010/main" w="9525">
                   <a:solidFill>
                     <a:srgbClr val="000000"/>
                   </a:solidFill>
@@ -2707,7 +2708,7 @@
             </a:ln>
             <a:extLst>
               <a:ext uri="{91240B29-F687-4f45-9708-019B960494DF}">
-                <a14:hiddenLine xmlns:a14="http://schemas.microsoft.com/office/drawing/2010/main" xmlns="" w="9525">
+                <a14:hiddenLine xmlns="" xmlns:a14="http://schemas.microsoft.com/office/drawing/2010/main" w="9525">
                   <a:solidFill>
                     <a:srgbClr val="000000"/>
                   </a:solidFill>
@@ -2775,7 +2776,7 @@
             </a:ln>
             <a:extLst>
               <a:ext uri="{91240B29-F687-4f45-9708-019B960494DF}">
-                <a14:hiddenLine xmlns:a14="http://schemas.microsoft.com/office/drawing/2010/main" xmlns="" w="9525">
+                <a14:hiddenLine xmlns="" xmlns:a14="http://schemas.microsoft.com/office/drawing/2010/main" w="9525">
                   <a:solidFill>
                     <a:srgbClr val="000000"/>
                   </a:solidFill>
@@ -2837,7 +2838,7 @@
             </a:ln>
             <a:extLst>
               <a:ext uri="{91240B29-F687-4f45-9708-019B960494DF}">
-                <a14:hiddenLine xmlns:a14="http://schemas.microsoft.com/office/drawing/2010/main" xmlns="" w="9525">
+                <a14:hiddenLine xmlns="" xmlns:a14="http://schemas.microsoft.com/office/drawing/2010/main" w="9525">
                   <a:solidFill>
                     <a:srgbClr val="000000"/>
                   </a:solidFill>
@@ -2927,7 +2928,7 @@
             </a:ln>
             <a:extLst>
               <a:ext uri="{91240B29-F687-4f45-9708-019B960494DF}">
-                <a14:hiddenLine xmlns:a14="http://schemas.microsoft.com/office/drawing/2010/main" xmlns="" w="9525">
+                <a14:hiddenLine xmlns="" xmlns:a14="http://schemas.microsoft.com/office/drawing/2010/main" w="9525">
                   <a:solidFill>
                     <a:srgbClr val="000000"/>
                   </a:solidFill>
@@ -2989,7 +2990,7 @@
             </a:ln>
             <a:extLst>
               <a:ext uri="{91240B29-F687-4f45-9708-019B960494DF}">
-                <a14:hiddenLine xmlns:a14="http://schemas.microsoft.com/office/drawing/2010/main" xmlns="" w="9525">
+                <a14:hiddenLine xmlns="" xmlns:a14="http://schemas.microsoft.com/office/drawing/2010/main" w="9525">
                   <a:solidFill>
                     <a:srgbClr val="000000"/>
                   </a:solidFill>
@@ -3079,7 +3080,7 @@
             </a:ln>
             <a:extLst>
               <a:ext uri="{91240B29-F687-4f45-9708-019B960494DF}">
-                <a14:hiddenLine xmlns:a14="http://schemas.microsoft.com/office/drawing/2010/main" xmlns="" w="9525">
+                <a14:hiddenLine xmlns="" xmlns:a14="http://schemas.microsoft.com/office/drawing/2010/main" w="9525">
                   <a:solidFill>
                     <a:srgbClr val="000000"/>
                   </a:solidFill>
@@ -3141,7 +3142,7 @@
             </a:ln>
             <a:extLst>
               <a:ext uri="{91240B29-F687-4f45-9708-019B960494DF}">
-                <a14:hiddenLine xmlns:a14="http://schemas.microsoft.com/office/drawing/2010/main" xmlns="" w="9525">
+                <a14:hiddenLine xmlns="" xmlns:a14="http://schemas.microsoft.com/office/drawing/2010/main" w="9525">
                   <a:solidFill>
                     <a:srgbClr val="000000"/>
                   </a:solidFill>
@@ -3231,7 +3232,7 @@
             </a:ln>
             <a:extLst>
               <a:ext uri="{91240B29-F687-4f45-9708-019B960494DF}">
-                <a14:hiddenLine xmlns:a14="http://schemas.microsoft.com/office/drawing/2010/main" xmlns="" w="9525">
+                <a14:hiddenLine xmlns="" xmlns:a14="http://schemas.microsoft.com/office/drawing/2010/main" w="9525">
                   <a:solidFill>
                     <a:srgbClr val="000000"/>
                   </a:solidFill>
@@ -3265,7 +3266,7 @@
             </a:ln>
             <a:extLst>
               <a:ext uri="{91240B29-F687-4f45-9708-019B960494DF}">
-                <a14:hiddenLine xmlns:a14="http://schemas.microsoft.com/office/drawing/2010/main" xmlns="" w="9525">
+                <a14:hiddenLine xmlns="" xmlns:a14="http://schemas.microsoft.com/office/drawing/2010/main" w="9525">
                   <a:solidFill>
                     <a:srgbClr val="000000"/>
                   </a:solidFill>
@@ -3330,7 +3331,7 @@
             </a:ln>
             <a:extLst>
               <a:ext uri="{91240B29-F687-4f45-9708-019B960494DF}">
-                <a14:hiddenLine xmlns:a14="http://schemas.microsoft.com/office/drawing/2010/main" xmlns="" w="9525">
+                <a14:hiddenLine xmlns="" xmlns:a14="http://schemas.microsoft.com/office/drawing/2010/main" w="9525">
                   <a:solidFill>
                     <a:srgbClr val="000000"/>
                   </a:solidFill>
@@ -3420,7 +3421,7 @@
             </a:ln>
             <a:extLst>
               <a:ext uri="{91240B29-F687-4f45-9708-019B960494DF}">
-                <a14:hiddenLine xmlns:a14="http://schemas.microsoft.com/office/drawing/2010/main" xmlns="" w="9525">
+                <a14:hiddenLine xmlns="" xmlns:a14="http://schemas.microsoft.com/office/drawing/2010/main" w="9525">
                   <a:solidFill>
                     <a:srgbClr val="000000"/>
                   </a:solidFill>
@@ -3482,7 +3483,7 @@
             </a:ln>
             <a:extLst>
               <a:ext uri="{91240B29-F687-4f45-9708-019B960494DF}">
-                <a14:hiddenLine xmlns:a14="http://schemas.microsoft.com/office/drawing/2010/main" xmlns="" w="9525">
+                <a14:hiddenLine xmlns="" xmlns:a14="http://schemas.microsoft.com/office/drawing/2010/main" w="9525">
                   <a:solidFill>
                     <a:srgbClr val="000000"/>
                   </a:solidFill>
@@ -3572,7 +3573,7 @@
             </a:ln>
             <a:extLst>
               <a:ext uri="{91240B29-F687-4f45-9708-019B960494DF}">
-                <a14:hiddenLine xmlns:a14="http://schemas.microsoft.com/office/drawing/2010/main" xmlns="" w="9525">
+                <a14:hiddenLine xmlns="" xmlns:a14="http://schemas.microsoft.com/office/drawing/2010/main" w="9525">
                   <a:solidFill>
                     <a:srgbClr val="000000"/>
                   </a:solidFill>
@@ -3662,7 +3663,7 @@
             </a:ln>
             <a:extLst>
               <a:ext uri="{91240B29-F687-4f45-9708-019B960494DF}">
-                <a14:hiddenLine xmlns:a14="http://schemas.microsoft.com/office/drawing/2010/main" xmlns="" w="9525">
+                <a14:hiddenLine xmlns="" xmlns:a14="http://schemas.microsoft.com/office/drawing/2010/main" w="9525">
                   <a:solidFill>
                     <a:srgbClr val="000000"/>
                   </a:solidFill>
@@ -3727,7 +3728,7 @@
             </a:ln>
             <a:extLst>
               <a:ext uri="{91240B29-F687-4f45-9708-019B960494DF}">
-                <a14:hiddenLine xmlns:a14="http://schemas.microsoft.com/office/drawing/2010/main" xmlns="" w="9525">
+                <a14:hiddenLine xmlns="" xmlns:a14="http://schemas.microsoft.com/office/drawing/2010/main" w="9525">
                   <a:solidFill>
                     <a:srgbClr val="000000"/>
                   </a:solidFill>
@@ -3789,7 +3790,7 @@
             </a:ln>
             <a:extLst>
               <a:ext uri="{91240B29-F687-4f45-9708-019B960494DF}">
-                <a14:hiddenLine xmlns:a14="http://schemas.microsoft.com/office/drawing/2010/main" xmlns="" w="9525">
+                <a14:hiddenLine xmlns="" xmlns:a14="http://schemas.microsoft.com/office/drawing/2010/main" w="9525">
                   <a:solidFill>
                     <a:srgbClr val="000000"/>
                   </a:solidFill>
@@ -3879,7 +3880,7 @@
             </a:ln>
             <a:extLst>
               <a:ext uri="{91240B29-F687-4f45-9708-019B960494DF}">
-                <a14:hiddenLine xmlns:a14="http://schemas.microsoft.com/office/drawing/2010/main" xmlns="" w="9525">
+                <a14:hiddenLine xmlns="" xmlns:a14="http://schemas.microsoft.com/office/drawing/2010/main" w="9525">
                   <a:solidFill>
                     <a:srgbClr val="000000"/>
                   </a:solidFill>
@@ -3969,7 +3970,7 @@
             </a:ln>
             <a:extLst>
               <a:ext uri="{91240B29-F687-4f45-9708-019B960494DF}">
-                <a14:hiddenLine xmlns:a14="http://schemas.microsoft.com/office/drawing/2010/main" xmlns="" w="9525">
+                <a14:hiddenLine xmlns="" xmlns:a14="http://schemas.microsoft.com/office/drawing/2010/main" w="9525">
                   <a:solidFill>
                     <a:srgbClr val="000000"/>
                   </a:solidFill>
@@ -4031,7 +4032,7 @@
             </a:ln>
             <a:extLst>
               <a:ext uri="{91240B29-F687-4f45-9708-019B960494DF}">
-                <a14:hiddenLine xmlns:a14="http://schemas.microsoft.com/office/drawing/2010/main" xmlns="" w="9525">
+                <a14:hiddenLine xmlns="" xmlns:a14="http://schemas.microsoft.com/office/drawing/2010/main" w="9525">
                   <a:solidFill>
                     <a:srgbClr val="000000"/>
                   </a:solidFill>
@@ -4151,7 +4152,7 @@
             </a:ln>
             <a:extLst>
               <a:ext uri="{91240B29-F687-4f45-9708-019B960494DF}">
-                <a14:hiddenLine xmlns:a14="http://schemas.microsoft.com/office/drawing/2010/main" xmlns="" w="9525">
+                <a14:hiddenLine xmlns="" xmlns:a14="http://schemas.microsoft.com/office/drawing/2010/main" w="9525">
                   <a:solidFill>
                     <a:srgbClr val="000000"/>
                   </a:solidFill>
@@ -4219,7 +4220,7 @@
             </a:ln>
             <a:extLst>
               <a:ext uri="{91240B29-F687-4f45-9708-019B960494DF}">
-                <a14:hiddenLine xmlns:a14="http://schemas.microsoft.com/office/drawing/2010/main" xmlns="" w="9525">
+                <a14:hiddenLine xmlns="" xmlns:a14="http://schemas.microsoft.com/office/drawing/2010/main" w="9525">
                   <a:solidFill>
                     <a:srgbClr val="000000"/>
                   </a:solidFill>
@@ -4309,7 +4310,7 @@
             </a:ln>
             <a:extLst>
               <a:ext uri="{91240B29-F687-4f45-9708-019B960494DF}">
-                <a14:hiddenLine xmlns:a14="http://schemas.microsoft.com/office/drawing/2010/main" xmlns="" w="9525">
+                <a14:hiddenLine xmlns="" xmlns:a14="http://schemas.microsoft.com/office/drawing/2010/main" w="9525">
                   <a:solidFill>
                     <a:srgbClr val="000000"/>
                   </a:solidFill>
@@ -4449,7 +4450,7 @@
           <a:p>
             <a:fld id="{951AF1EB-82F2-4C84-AADB-635468081963}" type="datetimeFigureOut">
               <a:rPr lang="en-US" smtClean="0"/>
-              <a:t>10/08/2022</a:t>
+              <a:t>15/08/2022</a:t>
             </a:fld>
             <a:endParaRPr lang="en-US"/>
           </a:p>
@@ -4716,7 +4717,7 @@
           <a:p>
             <a:fld id="{951AF1EB-82F2-4C84-AADB-635468081963}" type="datetimeFigureOut">
               <a:rPr lang="en-US" smtClean="0"/>
-              <a:t>10/08/2022</a:t>
+              <a:t>15/08/2022</a:t>
             </a:fld>
             <a:endParaRPr lang="en-US"/>
           </a:p>
@@ -4912,7 +4913,7 @@
           <a:p>
             <a:fld id="{951AF1EB-82F2-4C84-AADB-635468081963}" type="datetimeFigureOut">
               <a:rPr lang="en-US" smtClean="0"/>
-              <a:t>10/08/2022</a:t>
+              <a:t>15/08/2022</a:t>
             </a:fld>
             <a:endParaRPr lang="en-US"/>
           </a:p>
@@ -5175,7 +5176,7 @@
           <a:p>
             <a:fld id="{951AF1EB-82F2-4C84-AADB-635468081963}" type="datetimeFigureOut">
               <a:rPr lang="en-US" smtClean="0"/>
-              <a:t>10/08/2022</a:t>
+              <a:t>15/08/2022</a:t>
             </a:fld>
             <a:endParaRPr lang="en-US"/>
           </a:p>
@@ -5609,7 +5610,7 @@
           <a:p>
             <a:fld id="{951AF1EB-82F2-4C84-AADB-635468081963}" type="datetimeFigureOut">
               <a:rPr lang="en-US" smtClean="0"/>
-              <a:t>10/08/2022</a:t>
+              <a:t>15/08/2022</a:t>
             </a:fld>
             <a:endParaRPr lang="en-US"/>
           </a:p>
@@ -6155,7 +6156,7 @@
           <a:p>
             <a:fld id="{951AF1EB-82F2-4C84-AADB-635468081963}" type="datetimeFigureOut">
               <a:rPr lang="en-US" smtClean="0"/>
-              <a:t>10/08/2022</a:t>
+              <a:t>15/08/2022</a:t>
             </a:fld>
             <a:endParaRPr lang="en-US"/>
           </a:p>
@@ -6875,7 +6876,7 @@
           <a:p>
             <a:fld id="{951AF1EB-82F2-4C84-AADB-635468081963}" type="datetimeFigureOut">
               <a:rPr lang="en-US" smtClean="0"/>
-              <a:t>10/08/2022</a:t>
+              <a:t>15/08/2022</a:t>
             </a:fld>
             <a:endParaRPr lang="en-US"/>
           </a:p>
@@ -7045,7 +7046,7 @@
           <a:p>
             <a:fld id="{951AF1EB-82F2-4C84-AADB-635468081963}" type="datetimeFigureOut">
               <a:rPr lang="en-US" smtClean="0"/>
-              <a:t>10/08/2022</a:t>
+              <a:t>15/08/2022</a:t>
             </a:fld>
             <a:endParaRPr lang="en-US"/>
           </a:p>
@@ -7225,7 +7226,7 @@
           <a:p>
             <a:fld id="{951AF1EB-82F2-4C84-AADB-635468081963}" type="datetimeFigureOut">
               <a:rPr lang="en-US" smtClean="0"/>
-              <a:t>10/08/2022</a:t>
+              <a:t>15/08/2022</a:t>
             </a:fld>
             <a:endParaRPr lang="en-US"/>
           </a:p>
@@ -7395,7 +7396,7 @@
           <a:p>
             <a:fld id="{951AF1EB-82F2-4C84-AADB-635468081963}" type="datetimeFigureOut">
               <a:rPr lang="en-US" smtClean="0"/>
-              <a:t>10/08/2022</a:t>
+              <a:t>15/08/2022</a:t>
             </a:fld>
             <a:endParaRPr lang="en-US"/>
           </a:p>
@@ -7645,7 +7646,7 @@
           <a:p>
             <a:fld id="{951AF1EB-82F2-4C84-AADB-635468081963}" type="datetimeFigureOut">
               <a:rPr lang="en-US" smtClean="0"/>
-              <a:t>10/08/2022</a:t>
+              <a:t>15/08/2022</a:t>
             </a:fld>
             <a:endParaRPr lang="en-US"/>
           </a:p>
@@ -7877,7 +7878,7 @@
           <a:p>
             <a:fld id="{951AF1EB-82F2-4C84-AADB-635468081963}" type="datetimeFigureOut">
               <a:rPr lang="en-US" smtClean="0"/>
-              <a:t>10/08/2022</a:t>
+              <a:t>15/08/2022</a:t>
             </a:fld>
             <a:endParaRPr lang="en-US"/>
           </a:p>
@@ -8258,7 +8259,7 @@
           <a:p>
             <a:fld id="{951AF1EB-82F2-4C84-AADB-635468081963}" type="datetimeFigureOut">
               <a:rPr lang="en-US" smtClean="0"/>
-              <a:t>10/08/2022</a:t>
+              <a:t>15/08/2022</a:t>
             </a:fld>
             <a:endParaRPr lang="en-US"/>
           </a:p>
@@ -8376,7 +8377,7 @@
           <a:p>
             <a:fld id="{951AF1EB-82F2-4C84-AADB-635468081963}" type="datetimeFigureOut">
               <a:rPr lang="en-US" smtClean="0"/>
-              <a:t>10/08/2022</a:t>
+              <a:t>15/08/2022</a:t>
             </a:fld>
             <a:endParaRPr lang="en-US"/>
           </a:p>
@@ -8471,7 +8472,7 @@
           <a:p>
             <a:fld id="{951AF1EB-82F2-4C84-AADB-635468081963}" type="datetimeFigureOut">
               <a:rPr lang="en-US" smtClean="0"/>
-              <a:t>10/08/2022</a:t>
+              <a:t>15/08/2022</a:t>
             </a:fld>
             <a:endParaRPr lang="en-US"/>
           </a:p>
@@ -8720,7 +8721,7 @@
           <a:p>
             <a:fld id="{951AF1EB-82F2-4C84-AADB-635468081963}" type="datetimeFigureOut">
               <a:rPr lang="en-US" smtClean="0"/>
-              <a:t>10/08/2022</a:t>
+              <a:t>15/08/2022</a:t>
             </a:fld>
             <a:endParaRPr lang="en-US"/>
           </a:p>
@@ -9000,7 +9001,7 @@
           <a:p>
             <a:fld id="{951AF1EB-82F2-4C84-AADB-635468081963}" type="datetimeFigureOut">
               <a:rPr lang="en-US" smtClean="0"/>
-              <a:t>10/08/2022</a:t>
+              <a:t>15/08/2022</a:t>
             </a:fld>
             <a:endParaRPr lang="en-US"/>
           </a:p>
@@ -9116,7 +9117,7 @@
           <a:noFill/>
           <a:extLst>
             <a:ext uri="{909E8E84-426E-40dd-AFC4-6F175D3DCCD1}">
-              <a14:hiddenFill xmlns:a14="http://schemas.microsoft.com/office/drawing/2010/main" xmlns="">
+              <a14:hiddenFill xmlns="" xmlns:a14="http://schemas.microsoft.com/office/drawing/2010/main">
                 <a:solidFill>
                   <a:srgbClr val="FFFFFF"/>
                 </a:solidFill>
@@ -9190,7 +9191,7 @@
               </a:ln>
               <a:extLst>
                 <a:ext uri="{91240B29-F687-4f45-9708-019B960494DF}">
-                  <a14:hiddenLine xmlns:a14="http://schemas.microsoft.com/office/drawing/2010/main" xmlns="" w="9525">
+                  <a14:hiddenLine xmlns="" xmlns:a14="http://schemas.microsoft.com/office/drawing/2010/main" w="9525">
                     <a:solidFill>
                       <a:srgbClr val="000000"/>
                     </a:solidFill>
@@ -9280,7 +9281,7 @@
               </a:ln>
               <a:extLst>
                 <a:ext uri="{91240B29-F687-4f45-9708-019B960494DF}">
-                  <a14:hiddenLine xmlns:a14="http://schemas.microsoft.com/office/drawing/2010/main" xmlns="" w="9525">
+                  <a14:hiddenLine xmlns="" xmlns:a14="http://schemas.microsoft.com/office/drawing/2010/main" w="9525">
                     <a:solidFill>
                       <a:srgbClr val="000000"/>
                     </a:solidFill>
@@ -9370,7 +9371,7 @@
               </a:ln>
               <a:extLst>
                 <a:ext uri="{91240B29-F687-4f45-9708-019B960494DF}">
-                  <a14:hiddenLine xmlns:a14="http://schemas.microsoft.com/office/drawing/2010/main" xmlns="" w="9525">
+                  <a14:hiddenLine xmlns="" xmlns:a14="http://schemas.microsoft.com/office/drawing/2010/main" w="9525">
                     <a:solidFill>
                       <a:srgbClr val="000000"/>
                     </a:solidFill>
@@ -9432,7 +9433,7 @@
               </a:ln>
               <a:extLst>
                 <a:ext uri="{91240B29-F687-4f45-9708-019B960494DF}">
-                  <a14:hiddenLine xmlns:a14="http://schemas.microsoft.com/office/drawing/2010/main" xmlns="" w="9525">
+                  <a14:hiddenLine xmlns="" xmlns:a14="http://schemas.microsoft.com/office/drawing/2010/main" w="9525">
                     <a:solidFill>
                       <a:srgbClr val="000000"/>
                     </a:solidFill>
@@ -9522,7 +9523,7 @@
               </a:ln>
               <a:extLst>
                 <a:ext uri="{91240B29-F687-4f45-9708-019B960494DF}">
-                  <a14:hiddenLine xmlns:a14="http://schemas.microsoft.com/office/drawing/2010/main" xmlns="" w="9525">
+                  <a14:hiddenLine xmlns="" xmlns:a14="http://schemas.microsoft.com/office/drawing/2010/main" w="9525">
                     <a:solidFill>
                       <a:srgbClr val="000000"/>
                     </a:solidFill>
@@ -9584,7 +9585,7 @@
               </a:ln>
               <a:extLst>
                 <a:ext uri="{91240B29-F687-4f45-9708-019B960494DF}">
-                  <a14:hiddenLine xmlns:a14="http://schemas.microsoft.com/office/drawing/2010/main" xmlns="" w="9525">
+                  <a14:hiddenLine xmlns="" xmlns:a14="http://schemas.microsoft.com/office/drawing/2010/main" w="9525">
                     <a:solidFill>
                       <a:srgbClr val="000000"/>
                     </a:solidFill>
@@ -9646,7 +9647,7 @@
               </a:ln>
               <a:extLst>
                 <a:ext uri="{91240B29-F687-4f45-9708-019B960494DF}">
-                  <a14:hiddenLine xmlns:a14="http://schemas.microsoft.com/office/drawing/2010/main" xmlns="" w="9525">
+                  <a14:hiddenLine xmlns="" xmlns:a14="http://schemas.microsoft.com/office/drawing/2010/main" w="9525">
                     <a:solidFill>
                       <a:srgbClr val="000000"/>
                     </a:solidFill>
@@ -9736,7 +9737,7 @@
               </a:ln>
               <a:extLst>
                 <a:ext uri="{91240B29-F687-4f45-9708-019B960494DF}">
-                  <a14:hiddenLine xmlns:a14="http://schemas.microsoft.com/office/drawing/2010/main" xmlns="" w="9525">
+                  <a14:hiddenLine xmlns="" xmlns:a14="http://schemas.microsoft.com/office/drawing/2010/main" w="9525">
                     <a:solidFill>
                       <a:srgbClr val="000000"/>
                     </a:solidFill>
@@ -9826,7 +9827,7 @@
               </a:ln>
               <a:extLst>
                 <a:ext uri="{91240B29-F687-4f45-9708-019B960494DF}">
-                  <a14:hiddenLine xmlns:a14="http://schemas.microsoft.com/office/drawing/2010/main" xmlns="" w="9525">
+                  <a14:hiddenLine xmlns="" xmlns:a14="http://schemas.microsoft.com/office/drawing/2010/main" w="9525">
                     <a:solidFill>
                       <a:srgbClr val="000000"/>
                     </a:solidFill>
@@ -9888,7 +9889,7 @@
               </a:ln>
               <a:extLst>
                 <a:ext uri="{91240B29-F687-4f45-9708-019B960494DF}">
-                  <a14:hiddenLine xmlns:a14="http://schemas.microsoft.com/office/drawing/2010/main" xmlns="" w="9525">
+                  <a14:hiddenLine xmlns="" xmlns:a14="http://schemas.microsoft.com/office/drawing/2010/main" w="9525">
                     <a:solidFill>
                       <a:srgbClr val="000000"/>
                     </a:solidFill>
@@ -9998,7 +9999,7 @@
               </a:ln>
               <a:extLst>
                 <a:ext uri="{91240B29-F687-4f45-9708-019B960494DF}">
-                  <a14:hiddenLine xmlns:a14="http://schemas.microsoft.com/office/drawing/2010/main" xmlns="" w="9525">
+                  <a14:hiddenLine xmlns="" xmlns:a14="http://schemas.microsoft.com/office/drawing/2010/main" w="9525">
                     <a:solidFill>
                       <a:srgbClr val="000000"/>
                     </a:solidFill>
@@ -10082,7 +10083,7 @@
               </a:ln>
               <a:extLst>
                 <a:ext uri="{91240B29-F687-4f45-9708-019B960494DF}">
-                  <a14:hiddenLine xmlns:a14="http://schemas.microsoft.com/office/drawing/2010/main" xmlns="" w="9525">
+                  <a14:hiddenLine xmlns="" xmlns:a14="http://schemas.microsoft.com/office/drawing/2010/main" w="9525">
                     <a:solidFill>
                       <a:srgbClr val="000000"/>
                     </a:solidFill>
@@ -10144,7 +10145,7 @@
               </a:ln>
               <a:extLst>
                 <a:ext uri="{91240B29-F687-4f45-9708-019B960494DF}">
-                  <a14:hiddenLine xmlns:a14="http://schemas.microsoft.com/office/drawing/2010/main" xmlns="" w="9525">
+                  <a14:hiddenLine xmlns="" xmlns:a14="http://schemas.microsoft.com/office/drawing/2010/main" w="9525">
                     <a:solidFill>
                       <a:srgbClr val="000000"/>
                     </a:solidFill>
@@ -10206,7 +10207,7 @@
               </a:ln>
               <a:extLst>
                 <a:ext uri="{91240B29-F687-4f45-9708-019B960494DF}">
-                  <a14:hiddenLine xmlns:a14="http://schemas.microsoft.com/office/drawing/2010/main" xmlns="" w="9525">
+                  <a14:hiddenLine xmlns="" xmlns:a14="http://schemas.microsoft.com/office/drawing/2010/main" w="9525">
                     <a:solidFill>
                       <a:srgbClr val="000000"/>
                     </a:solidFill>
@@ -10296,7 +10297,7 @@
               </a:ln>
               <a:extLst>
                 <a:ext uri="{91240B29-F687-4f45-9708-019B960494DF}">
-                  <a14:hiddenLine xmlns:a14="http://schemas.microsoft.com/office/drawing/2010/main" xmlns="" w="9525">
+                  <a14:hiddenLine xmlns="" xmlns:a14="http://schemas.microsoft.com/office/drawing/2010/main" w="9525">
                     <a:solidFill>
                       <a:srgbClr val="000000"/>
                     </a:solidFill>
@@ -10330,7 +10331,7 @@
               </a:ln>
               <a:extLst>
                 <a:ext uri="{91240B29-F687-4f45-9708-019B960494DF}">
-                  <a14:hiddenLine xmlns:a14="http://schemas.microsoft.com/office/drawing/2010/main" xmlns="" w="9525">
+                  <a14:hiddenLine xmlns="" xmlns:a14="http://schemas.microsoft.com/office/drawing/2010/main" w="9525">
                     <a:solidFill>
                       <a:srgbClr val="000000"/>
                     </a:solidFill>
@@ -10395,7 +10396,7 @@
               </a:ln>
               <a:extLst>
                 <a:ext uri="{91240B29-F687-4f45-9708-019B960494DF}">
-                  <a14:hiddenLine xmlns:a14="http://schemas.microsoft.com/office/drawing/2010/main" xmlns="" w="9525">
+                  <a14:hiddenLine xmlns="" xmlns:a14="http://schemas.microsoft.com/office/drawing/2010/main" w="9525">
                     <a:solidFill>
                       <a:srgbClr val="000000"/>
                     </a:solidFill>
@@ -10485,7 +10486,7 @@
               </a:ln>
               <a:extLst>
                 <a:ext uri="{91240B29-F687-4f45-9708-019B960494DF}">
-                  <a14:hiddenLine xmlns:a14="http://schemas.microsoft.com/office/drawing/2010/main" xmlns="" w="9525">
+                  <a14:hiddenLine xmlns="" xmlns:a14="http://schemas.microsoft.com/office/drawing/2010/main" w="9525">
                     <a:solidFill>
                       <a:srgbClr val="000000"/>
                     </a:solidFill>
@@ -10547,7 +10548,7 @@
               </a:ln>
               <a:extLst>
                 <a:ext uri="{91240B29-F687-4f45-9708-019B960494DF}">
-                  <a14:hiddenLine xmlns:a14="http://schemas.microsoft.com/office/drawing/2010/main" xmlns="" w="9525">
+                  <a14:hiddenLine xmlns="" xmlns:a14="http://schemas.microsoft.com/office/drawing/2010/main" w="9525">
                     <a:solidFill>
                       <a:srgbClr val="000000"/>
                     </a:solidFill>
@@ -10637,7 +10638,7 @@
               </a:ln>
               <a:extLst>
                 <a:ext uri="{91240B29-F687-4f45-9708-019B960494DF}">
-                  <a14:hiddenLine xmlns:a14="http://schemas.microsoft.com/office/drawing/2010/main" xmlns="" w="9525">
+                  <a14:hiddenLine xmlns="" xmlns:a14="http://schemas.microsoft.com/office/drawing/2010/main" w="9525">
                     <a:solidFill>
                       <a:srgbClr val="000000"/>
                     </a:solidFill>
@@ -10702,7 +10703,7 @@
               </a:ln>
               <a:extLst>
                 <a:ext uri="{91240B29-F687-4f45-9708-019B960494DF}">
-                  <a14:hiddenLine xmlns:a14="http://schemas.microsoft.com/office/drawing/2010/main" xmlns="" w="9525">
+                  <a14:hiddenLine xmlns="" xmlns:a14="http://schemas.microsoft.com/office/drawing/2010/main" w="9525">
                     <a:solidFill>
                       <a:srgbClr val="000000"/>
                     </a:solidFill>
@@ -10764,7 +10765,7 @@
               </a:ln>
               <a:extLst>
                 <a:ext uri="{91240B29-F687-4f45-9708-019B960494DF}">
-                  <a14:hiddenLine xmlns:a14="http://schemas.microsoft.com/office/drawing/2010/main" xmlns="" w="9525">
+                  <a14:hiddenLine xmlns="" xmlns:a14="http://schemas.microsoft.com/office/drawing/2010/main" w="9525">
                     <a:solidFill>
                       <a:srgbClr val="000000"/>
                     </a:solidFill>
@@ -10854,7 +10855,7 @@
               </a:ln>
               <a:extLst>
                 <a:ext uri="{91240B29-F687-4f45-9708-019B960494DF}">
-                  <a14:hiddenLine xmlns:a14="http://schemas.microsoft.com/office/drawing/2010/main" xmlns="" w="9525">
+                  <a14:hiddenLine xmlns="" xmlns:a14="http://schemas.microsoft.com/office/drawing/2010/main" w="9525">
                     <a:solidFill>
                       <a:srgbClr val="000000"/>
                     </a:solidFill>
@@ -10944,7 +10945,7 @@
               </a:ln>
               <a:extLst>
                 <a:ext uri="{91240B29-F687-4f45-9708-019B960494DF}">
-                  <a14:hiddenLine xmlns:a14="http://schemas.microsoft.com/office/drawing/2010/main" xmlns="" w="9525">
+                  <a14:hiddenLine xmlns="" xmlns:a14="http://schemas.microsoft.com/office/drawing/2010/main" w="9525">
                     <a:solidFill>
                       <a:srgbClr val="000000"/>
                     </a:solidFill>
@@ -11009,7 +11010,7 @@
               </a:ln>
               <a:extLst>
                 <a:ext uri="{91240B29-F687-4f45-9708-019B960494DF}">
-                  <a14:hiddenLine xmlns:a14="http://schemas.microsoft.com/office/drawing/2010/main" xmlns="" w="9525">
+                  <a14:hiddenLine xmlns="" xmlns:a14="http://schemas.microsoft.com/office/drawing/2010/main" w="9525">
                     <a:solidFill>
                       <a:srgbClr val="000000"/>
                     </a:solidFill>
@@ -11129,7 +11130,7 @@
               </a:ln>
               <a:extLst>
                 <a:ext uri="{91240B29-F687-4f45-9708-019B960494DF}">
-                  <a14:hiddenLine xmlns:a14="http://schemas.microsoft.com/office/drawing/2010/main" xmlns="" w="9525">
+                  <a14:hiddenLine xmlns="" xmlns:a14="http://schemas.microsoft.com/office/drawing/2010/main" w="9525">
                     <a:solidFill>
                       <a:srgbClr val="000000"/>
                     </a:solidFill>
@@ -11227,7 +11228,7 @@
               </a:ln>
               <a:extLst>
                 <a:ext uri="{91240B29-F687-4f45-9708-019B960494DF}">
-                  <a14:hiddenLine xmlns:a14="http://schemas.microsoft.com/office/drawing/2010/main" xmlns="" w="9525">
+                  <a14:hiddenLine xmlns="" xmlns:a14="http://schemas.microsoft.com/office/drawing/2010/main" w="9525">
                     <a:solidFill>
                       <a:srgbClr val="000000"/>
                     </a:solidFill>
@@ -11342,7 +11343,7 @@
               </a:ln>
               <a:extLst>
                 <a:ext uri="{91240B29-F687-4f45-9708-019B960494DF}">
-                  <a14:hiddenLine xmlns:a14="http://schemas.microsoft.com/office/drawing/2010/main" xmlns="" w="9525">
+                  <a14:hiddenLine xmlns="" xmlns:a14="http://schemas.microsoft.com/office/drawing/2010/main" w="9525">
                     <a:solidFill>
                       <a:srgbClr val="000000"/>
                     </a:solidFill>
@@ -11432,7 +11433,7 @@
               </a:ln>
               <a:extLst>
                 <a:ext uri="{91240B29-F687-4f45-9708-019B960494DF}">
-                  <a14:hiddenLine xmlns:a14="http://schemas.microsoft.com/office/drawing/2010/main" xmlns="" w="9525">
+                  <a14:hiddenLine xmlns="" xmlns:a14="http://schemas.microsoft.com/office/drawing/2010/main" w="9525">
                     <a:solidFill>
                       <a:srgbClr val="000000"/>
                     </a:solidFill>
@@ -11497,7 +11498,7 @@
               </a:ln>
               <a:extLst>
                 <a:ext uri="{91240B29-F687-4f45-9708-019B960494DF}">
-                  <a14:hiddenLine xmlns:a14="http://schemas.microsoft.com/office/drawing/2010/main" xmlns="" w="9525">
+                  <a14:hiddenLine xmlns="" xmlns:a14="http://schemas.microsoft.com/office/drawing/2010/main" w="9525">
                     <a:solidFill>
                       <a:srgbClr val="000000"/>
                     </a:solidFill>
@@ -11587,7 +11588,7 @@
               </a:ln>
               <a:extLst>
                 <a:ext uri="{91240B29-F687-4f45-9708-019B960494DF}">
-                  <a14:hiddenLine xmlns:a14="http://schemas.microsoft.com/office/drawing/2010/main" xmlns="" w="9525">
+                  <a14:hiddenLine xmlns="" xmlns:a14="http://schemas.microsoft.com/office/drawing/2010/main" w="9525">
                     <a:solidFill>
                       <a:srgbClr val="000000"/>
                     </a:solidFill>
@@ -11655,7 +11656,7 @@
               </a:ln>
               <a:extLst>
                 <a:ext uri="{91240B29-F687-4f45-9708-019B960494DF}">
-                  <a14:hiddenLine xmlns:a14="http://schemas.microsoft.com/office/drawing/2010/main" xmlns="" w="9525">
+                  <a14:hiddenLine xmlns="" xmlns:a14="http://schemas.microsoft.com/office/drawing/2010/main" w="9525">
                     <a:solidFill>
                       <a:srgbClr val="000000"/>
                     </a:solidFill>
@@ -11745,7 +11746,7 @@
               </a:ln>
               <a:extLst>
                 <a:ext uri="{91240B29-F687-4f45-9708-019B960494DF}">
-                  <a14:hiddenLine xmlns:a14="http://schemas.microsoft.com/office/drawing/2010/main" xmlns="" w="9525">
+                  <a14:hiddenLine xmlns="" xmlns:a14="http://schemas.microsoft.com/office/drawing/2010/main" w="9525">
                     <a:solidFill>
                       <a:srgbClr val="000000"/>
                     </a:solidFill>
@@ -11813,7 +11814,7 @@
               </a:ln>
               <a:extLst>
                 <a:ext uri="{91240B29-F687-4f45-9708-019B960494DF}">
-                  <a14:hiddenLine xmlns:a14="http://schemas.microsoft.com/office/drawing/2010/main" xmlns="" w="9525">
+                  <a14:hiddenLine xmlns="" xmlns:a14="http://schemas.microsoft.com/office/drawing/2010/main" w="9525">
                     <a:solidFill>
                       <a:srgbClr val="000000"/>
                     </a:solidFill>
@@ -11903,7 +11904,7 @@
               </a:ln>
               <a:extLst>
                 <a:ext uri="{91240B29-F687-4f45-9708-019B960494DF}">
-                  <a14:hiddenLine xmlns:a14="http://schemas.microsoft.com/office/drawing/2010/main" xmlns="" w="9525">
+                  <a14:hiddenLine xmlns="" xmlns:a14="http://schemas.microsoft.com/office/drawing/2010/main" w="9525">
                     <a:solidFill>
                       <a:srgbClr val="000000"/>
                     </a:solidFill>
@@ -11937,7 +11938,7 @@
               </a:ln>
               <a:extLst>
                 <a:ext uri="{91240B29-F687-4f45-9708-019B960494DF}">
-                  <a14:hiddenLine xmlns:a14="http://schemas.microsoft.com/office/drawing/2010/main" xmlns="" w="9525">
+                  <a14:hiddenLine xmlns="" xmlns:a14="http://schemas.microsoft.com/office/drawing/2010/main" w="9525">
                     <a:solidFill>
                       <a:srgbClr val="000000"/>
                     </a:solidFill>
@@ -12077,7 +12078,7 @@
           <a:p>
             <a:fld id="{951AF1EB-82F2-4C84-AADB-635468081963}" type="datetimeFigureOut">
               <a:rPr lang="en-US" smtClean="0"/>
-              <a:t>10/08/2022</a:t>
+              <a:t>15/08/2022</a:t>
             </a:fld>
             <a:endParaRPr lang="en-US"/>
           </a:p>
@@ -18865,6 +18866,155 @@
 </p:sld>
 </file>
 
+<file path=ppt/slides/slide52.xml><?xml version="1.0" encoding="utf-8"?>
+<p:sld xmlns:a="http://schemas.openxmlformats.org/drawingml/2006/main" xmlns:r="http://schemas.openxmlformats.org/officeDocument/2006/relationships" xmlns:p="http://schemas.openxmlformats.org/presentationml/2006/main">
+  <p:cSld>
+    <p:spTree>
+      <p:nvGrpSpPr>
+        <p:cNvPr id="1" name=""/>
+        <p:cNvGrpSpPr/>
+        <p:nvPr/>
+      </p:nvGrpSpPr>
+      <p:grpSpPr>
+        <a:xfrm>
+          <a:off x="0" y="0"/>
+          <a:ext cx="0" cy="0"/>
+          <a:chOff x="0" y="0"/>
+          <a:chExt cx="0" cy="0"/>
+        </a:xfrm>
+      </p:grpSpPr>
+      <p:sp>
+        <p:nvSpPr>
+          <p:cNvPr id="2" name="Title 1">
+            <a:extLst>
+              <a:ext uri="{FF2B5EF4-FFF2-40B4-BE49-F238E27FC236}">
+                <a16:creationId xmlns:a16="http://schemas.microsoft.com/office/drawing/2014/main" id="{7536A5A0-6A70-C7CE-1030-952992936583}"/>
+              </a:ext>
+            </a:extLst>
+          </p:cNvPr>
+          <p:cNvSpPr>
+            <a:spLocks noGrp="1"/>
+          </p:cNvSpPr>
+          <p:nvPr>
+            <p:ph type="title"/>
+          </p:nvPr>
+        </p:nvSpPr>
+        <p:spPr/>
+        <p:txBody>
+          <a:bodyPr/>
+          <a:lstStyle/>
+          <a:p>
+            <a:r>
+              <a:rPr lang="en-US" dirty="0"/>
+              <a:t>products - </a:t>
+            </a:r>
+            <a:r>
+              <a:rPr lang="en-US" dirty="0" err="1"/>
+              <a:t>apis</a:t>
+            </a:r>
+            <a:endParaRPr lang="en-US" dirty="0"/>
+          </a:p>
+        </p:txBody>
+      </p:sp>
+      <p:sp>
+        <p:nvSpPr>
+          <p:cNvPr id="3" name="Content Placeholder 2">
+            <a:extLst>
+              <a:ext uri="{FF2B5EF4-FFF2-40B4-BE49-F238E27FC236}">
+                <a16:creationId xmlns:a16="http://schemas.microsoft.com/office/drawing/2014/main" id="{9700354A-2391-DCDF-C79A-FF1F664814C0}"/>
+              </a:ext>
+            </a:extLst>
+          </p:cNvPr>
+          <p:cNvSpPr>
+            <a:spLocks noGrp="1"/>
+          </p:cNvSpPr>
+          <p:nvPr>
+            <p:ph idx="1"/>
+          </p:nvPr>
+        </p:nvSpPr>
+        <p:spPr/>
+        <p:txBody>
+          <a:bodyPr>
+            <a:normAutofit/>
+          </a:bodyPr>
+          <a:lstStyle/>
+          <a:p>
+            <a:r>
+              <a:rPr lang="en-US" dirty="0"/>
+              <a:t>get, / - get all products</a:t>
+            </a:r>
+          </a:p>
+          <a:p>
+            <a:r>
+              <a:rPr lang="en-US" dirty="0"/>
+              <a:t>get, /:</a:t>
+            </a:r>
+            <a:r>
+              <a:rPr lang="en-US" dirty="0" err="1"/>
+              <a:t>searchByProductName</a:t>
+            </a:r>
+            <a:r>
+              <a:rPr lang="en-US" dirty="0"/>
+              <a:t> – get all products and will search only the contains the name</a:t>
+            </a:r>
+          </a:p>
+          <a:p>
+            <a:r>
+              <a:rPr lang="en-US" dirty="0"/>
+              <a:t>post, / - create new product</a:t>
+            </a:r>
+          </a:p>
+          <a:p>
+            <a:r>
+              <a:rPr lang="en-US" dirty="0"/>
+              <a:t>put, /:</a:t>
+            </a:r>
+            <a:r>
+              <a:rPr lang="en-US" dirty="0" err="1"/>
+              <a:t>prodId</a:t>
+            </a:r>
+            <a:r>
+              <a:rPr lang="en-US" dirty="0"/>
+              <a:t> - update product</a:t>
+            </a:r>
+          </a:p>
+          <a:p>
+            <a:r>
+              <a:rPr lang="en-US" dirty="0"/>
+              <a:t>delete, /:</a:t>
+            </a:r>
+            <a:r>
+              <a:rPr lang="en-US" dirty="0" err="1"/>
+              <a:t>prodId</a:t>
+            </a:r>
+            <a:r>
+              <a:rPr lang="en-US" dirty="0"/>
+              <a:t> – </a:t>
+            </a:r>
+            <a:r>
+              <a:rPr lang="en-US"/>
+              <a:t>delete product</a:t>
+            </a:r>
+            <a:endParaRPr lang="en-US" dirty="0"/>
+          </a:p>
+          <a:p>
+            <a:endParaRPr lang="en-US" dirty="0"/>
+          </a:p>
+        </p:txBody>
+      </p:sp>
+    </p:spTree>
+    <p:extLst>
+      <p:ext uri="{BB962C8B-B14F-4D97-AF65-F5344CB8AC3E}">
+        <p14:creationId xmlns:p14="http://schemas.microsoft.com/office/powerpoint/2010/main" val="2995462679"/>
+      </p:ext>
+    </p:extLst>
+  </p:cSld>
+  <p:clrMapOvr>
+    <a:masterClrMapping/>
+  </p:clrMapOvr>
+</p:sld>
+</file>
+
 <file path=ppt/slides/slide6.xml><?xml version="1.0" encoding="utf-8"?>
 <p:sld xmlns:a="http://schemas.openxmlformats.org/drawingml/2006/main" xmlns:r="http://schemas.openxmlformats.org/officeDocument/2006/relationships" xmlns:p="http://schemas.openxmlformats.org/presentationml/2006/main">
   <p:cSld>

</xml_diff>